<commit_message>
Changed flights listing to partial on the ppt
</commit_message>
<xml_diff>
--- a/Apresentação.pptx
+++ b/Apresentação.pptx
@@ -4,18 +4,19 @@
   <p:sldMasterIdLst>
     <p:sldMasterId id="2147483648" r:id="rId2"/>
     <p:sldMasterId id="2147483661" r:id="rId3"/>
+    <p:sldMasterId id="2147483674" r:id="rId4"/>
   </p:sldMasterIdLst>
   <p:sldIdLst>
-    <p:sldId id="256" r:id="rId4"/>
-    <p:sldId id="257" r:id="rId5"/>
-    <p:sldId id="258" r:id="rId6"/>
-    <p:sldId id="259" r:id="rId7"/>
-    <p:sldId id="260" r:id="rId8"/>
-    <p:sldId id="261" r:id="rId9"/>
-    <p:sldId id="262" r:id="rId10"/>
-    <p:sldId id="263" r:id="rId11"/>
-    <p:sldId id="264" r:id="rId12"/>
-    <p:sldId id="265" r:id="rId13"/>
+    <p:sldId id="256" r:id="rId5"/>
+    <p:sldId id="257" r:id="rId6"/>
+    <p:sldId id="258" r:id="rId7"/>
+    <p:sldId id="259" r:id="rId8"/>
+    <p:sldId id="260" r:id="rId9"/>
+    <p:sldId id="261" r:id="rId10"/>
+    <p:sldId id="262" r:id="rId11"/>
+    <p:sldId id="263" r:id="rId12"/>
+    <p:sldId id="264" r:id="rId13"/>
+    <p:sldId id="265" r:id="rId14"/>
   </p:sldIdLst>
   <p:sldSz cx="12192000" cy="6858000"/>
   <p:notesSz cx="7559675" cy="10691812"/>
@@ -2003,6 +2004,361 @@
 </p:sldLayout>
 </file>
 
+<file path=ppt/slideLayouts/slideLayout25.xml><?xml version="1.0" encoding="utf-8"?>
+<p:sldLayout xmlns:a="http://schemas.openxmlformats.org/drawingml/2006/main" xmlns:p="http://schemas.openxmlformats.org/presentationml/2006/main" xmlns:r="http://schemas.openxmlformats.org/officeDocument/2006/relationships" xmlns:p14="http://schemas.microsoft.com/office/powerpoint/2010/main" xmlns:p15="http://schemas.microsoft.com/office/powerpoint/2012/main" xmlns:mc="http://schemas.openxmlformats.org/markup-compatibility/2006" type="blank" preserve="1">
+  <p:cSld name="Blank Slide">
+    <p:spTree>
+      <p:nvGrpSpPr>
+        <p:cNvPr id="1" name=""/>
+        <p:cNvGrpSpPr/>
+        <p:nvPr/>
+      </p:nvGrpSpPr>
+      <p:grpSpPr>
+        <a:xfrm>
+          <a:off x="0" y="0"/>
+          <a:ext cx="0" cy="0"/>
+          <a:chOff x="0" y="0"/>
+          <a:chExt cx="0" cy="0"/>
+        </a:xfrm>
+      </p:grpSpPr>
+    </p:spTree>
+  </p:cSld>
+</p:sldLayout>
+</file>
+
+<file path=ppt/slideLayouts/slideLayout26.xml><?xml version="1.0" encoding="utf-8"?>
+<p:sldLayout xmlns:a="http://schemas.openxmlformats.org/drawingml/2006/main" xmlns:p="http://schemas.openxmlformats.org/presentationml/2006/main" xmlns:r="http://schemas.openxmlformats.org/officeDocument/2006/relationships" xmlns:p14="http://schemas.microsoft.com/office/powerpoint/2010/main" xmlns:p15="http://schemas.microsoft.com/office/powerpoint/2012/main" xmlns:mc="http://schemas.openxmlformats.org/markup-compatibility/2006" type="tx" preserve="1">
+  <p:cSld name="Title Slide">
+    <p:spTree>
+      <p:nvGrpSpPr>
+        <p:cNvPr id="1" name=""/>
+        <p:cNvGrpSpPr/>
+        <p:nvPr/>
+      </p:nvGrpSpPr>
+      <p:grpSpPr>
+        <a:xfrm>
+          <a:off x="0" y="0"/>
+          <a:ext cx="0" cy="0"/>
+          <a:chOff x="0" y="0"/>
+          <a:chExt cx="0" cy="0"/>
+        </a:xfrm>
+      </p:grpSpPr>
+      <p:sp>
+        <p:nvSpPr>
+          <p:cNvPr id="78" name="PlaceHolder 1"/>
+          <p:cNvSpPr>
+            <a:spLocks noGrp="1"/>
+          </p:cNvSpPr>
+          <p:nvPr>
+            <p:ph type="title"/>
+          </p:nvPr>
+        </p:nvSpPr>
+        <p:spPr>
+          <a:xfrm>
+            <a:off x="609480" y="273600"/>
+            <a:ext cx="10972440" cy="1144800"/>
+          </a:xfrm>
+          <a:prstGeom prst="rect">
+            <a:avLst/>
+          </a:prstGeom>
+        </p:spPr>
+        <p:txBody>
+          <a:bodyPr lIns="0" rIns="0" tIns="0" bIns="0" anchor="ctr">
+            <a:noAutofit/>
+          </a:bodyPr>
+          <a:p>
+            <a:pPr algn="ctr"/>
+            <a:endParaRPr b="0" lang="pt-PT" sz="4400" spc="-1" strike="noStrike">
+              <a:latin typeface="Arial"/>
+            </a:endParaRPr>
+          </a:p>
+        </p:txBody>
+      </p:sp>
+      <p:sp>
+        <p:nvSpPr>
+          <p:cNvPr id="79" name="PlaceHolder 2"/>
+          <p:cNvSpPr>
+            <a:spLocks noGrp="1"/>
+          </p:cNvSpPr>
+          <p:nvPr>
+            <p:ph type="subTitle"/>
+          </p:nvPr>
+        </p:nvSpPr>
+        <p:spPr>
+          <a:xfrm>
+            <a:off x="609480" y="1604520"/>
+            <a:ext cx="10972440" cy="3977280"/>
+          </a:xfrm>
+          <a:prstGeom prst="rect">
+            <a:avLst/>
+          </a:prstGeom>
+        </p:spPr>
+        <p:txBody>
+          <a:bodyPr lIns="0" rIns="0" tIns="0" bIns="0" anchor="ctr">
+            <a:noAutofit/>
+          </a:bodyPr>
+          <a:p>
+            <a:pPr algn="ctr"/>
+            <a:endParaRPr b="0" lang="pt-PT" sz="3200" spc="-1" strike="noStrike">
+              <a:latin typeface="Arial"/>
+            </a:endParaRPr>
+          </a:p>
+        </p:txBody>
+      </p:sp>
+    </p:spTree>
+  </p:cSld>
+</p:sldLayout>
+</file>
+
+<file path=ppt/slideLayouts/slideLayout27.xml><?xml version="1.0" encoding="utf-8"?>
+<p:sldLayout xmlns:a="http://schemas.openxmlformats.org/drawingml/2006/main" xmlns:p="http://schemas.openxmlformats.org/presentationml/2006/main" xmlns:r="http://schemas.openxmlformats.org/officeDocument/2006/relationships" xmlns:p14="http://schemas.microsoft.com/office/powerpoint/2010/main" xmlns:p15="http://schemas.microsoft.com/office/powerpoint/2012/main" xmlns:mc="http://schemas.openxmlformats.org/markup-compatibility/2006" type="obj" preserve="1">
+  <p:cSld name="Title, Content">
+    <p:spTree>
+      <p:nvGrpSpPr>
+        <p:cNvPr id="1" name=""/>
+        <p:cNvGrpSpPr/>
+        <p:nvPr/>
+      </p:nvGrpSpPr>
+      <p:grpSpPr>
+        <a:xfrm>
+          <a:off x="0" y="0"/>
+          <a:ext cx="0" cy="0"/>
+          <a:chOff x="0" y="0"/>
+          <a:chExt cx="0" cy="0"/>
+        </a:xfrm>
+      </p:grpSpPr>
+      <p:sp>
+        <p:nvSpPr>
+          <p:cNvPr id="80" name="PlaceHolder 1"/>
+          <p:cNvSpPr>
+            <a:spLocks noGrp="1"/>
+          </p:cNvSpPr>
+          <p:nvPr>
+            <p:ph type="title"/>
+          </p:nvPr>
+        </p:nvSpPr>
+        <p:spPr>
+          <a:xfrm>
+            <a:off x="609480" y="273600"/>
+            <a:ext cx="10972440" cy="1144800"/>
+          </a:xfrm>
+          <a:prstGeom prst="rect">
+            <a:avLst/>
+          </a:prstGeom>
+        </p:spPr>
+        <p:txBody>
+          <a:bodyPr lIns="0" rIns="0" tIns="0" bIns="0" anchor="ctr">
+            <a:noAutofit/>
+          </a:bodyPr>
+          <a:p>
+            <a:pPr algn="ctr"/>
+            <a:endParaRPr b="0" lang="pt-PT" sz="4400" spc="-1" strike="noStrike">
+              <a:latin typeface="Arial"/>
+            </a:endParaRPr>
+          </a:p>
+        </p:txBody>
+      </p:sp>
+      <p:sp>
+        <p:nvSpPr>
+          <p:cNvPr id="81" name="PlaceHolder 2"/>
+          <p:cNvSpPr>
+            <a:spLocks noGrp="1"/>
+          </p:cNvSpPr>
+          <p:nvPr>
+            <p:ph type="body"/>
+          </p:nvPr>
+        </p:nvSpPr>
+        <p:spPr>
+          <a:xfrm>
+            <a:off x="609480" y="1604520"/>
+            <a:ext cx="10972440" cy="3977280"/>
+          </a:xfrm>
+          <a:prstGeom prst="rect">
+            <a:avLst/>
+          </a:prstGeom>
+        </p:spPr>
+        <p:txBody>
+          <a:bodyPr lIns="0" rIns="0" tIns="0" bIns="0">
+            <a:normAutofit/>
+          </a:bodyPr>
+          <a:p>
+            <a:endParaRPr b="0" lang="pt-PT" sz="3200" spc="-1" strike="noStrike">
+              <a:latin typeface="Arial"/>
+            </a:endParaRPr>
+          </a:p>
+        </p:txBody>
+      </p:sp>
+    </p:spTree>
+  </p:cSld>
+</p:sldLayout>
+</file>
+
+<file path=ppt/slideLayouts/slideLayout28.xml><?xml version="1.0" encoding="utf-8"?>
+<p:sldLayout xmlns:a="http://schemas.openxmlformats.org/drawingml/2006/main" xmlns:p="http://schemas.openxmlformats.org/presentationml/2006/main" xmlns:r="http://schemas.openxmlformats.org/officeDocument/2006/relationships" xmlns:p14="http://schemas.microsoft.com/office/powerpoint/2010/main" xmlns:p15="http://schemas.microsoft.com/office/powerpoint/2012/main" xmlns:mc="http://schemas.openxmlformats.org/markup-compatibility/2006" type="twoObj" preserve="1">
+  <p:cSld name="Title, 2 Content">
+    <p:spTree>
+      <p:nvGrpSpPr>
+        <p:cNvPr id="1" name=""/>
+        <p:cNvGrpSpPr/>
+        <p:nvPr/>
+      </p:nvGrpSpPr>
+      <p:grpSpPr>
+        <a:xfrm>
+          <a:off x="0" y="0"/>
+          <a:ext cx="0" cy="0"/>
+          <a:chOff x="0" y="0"/>
+          <a:chExt cx="0" cy="0"/>
+        </a:xfrm>
+      </p:grpSpPr>
+      <p:sp>
+        <p:nvSpPr>
+          <p:cNvPr id="82" name="PlaceHolder 1"/>
+          <p:cNvSpPr>
+            <a:spLocks noGrp="1"/>
+          </p:cNvSpPr>
+          <p:nvPr>
+            <p:ph type="title"/>
+          </p:nvPr>
+        </p:nvSpPr>
+        <p:spPr>
+          <a:xfrm>
+            <a:off x="609480" y="273600"/>
+            <a:ext cx="10972440" cy="1144800"/>
+          </a:xfrm>
+          <a:prstGeom prst="rect">
+            <a:avLst/>
+          </a:prstGeom>
+        </p:spPr>
+        <p:txBody>
+          <a:bodyPr lIns="0" rIns="0" tIns="0" bIns="0" anchor="ctr">
+            <a:noAutofit/>
+          </a:bodyPr>
+          <a:p>
+            <a:pPr algn="ctr"/>
+            <a:endParaRPr b="0" lang="pt-PT" sz="4400" spc="-1" strike="noStrike">
+              <a:latin typeface="Arial"/>
+            </a:endParaRPr>
+          </a:p>
+        </p:txBody>
+      </p:sp>
+      <p:sp>
+        <p:nvSpPr>
+          <p:cNvPr id="83" name="PlaceHolder 2"/>
+          <p:cNvSpPr>
+            <a:spLocks noGrp="1"/>
+          </p:cNvSpPr>
+          <p:nvPr>
+            <p:ph type="body"/>
+          </p:nvPr>
+        </p:nvSpPr>
+        <p:spPr>
+          <a:xfrm>
+            <a:off x="609480" y="1604520"/>
+            <a:ext cx="5354280" cy="3977280"/>
+          </a:xfrm>
+          <a:prstGeom prst="rect">
+            <a:avLst/>
+          </a:prstGeom>
+        </p:spPr>
+        <p:txBody>
+          <a:bodyPr lIns="0" rIns="0" tIns="0" bIns="0">
+            <a:normAutofit/>
+          </a:bodyPr>
+          <a:p>
+            <a:endParaRPr b="0" lang="pt-PT" sz="3200" spc="-1" strike="noStrike">
+              <a:latin typeface="Arial"/>
+            </a:endParaRPr>
+          </a:p>
+        </p:txBody>
+      </p:sp>
+      <p:sp>
+        <p:nvSpPr>
+          <p:cNvPr id="84" name="PlaceHolder 3"/>
+          <p:cNvSpPr>
+            <a:spLocks noGrp="1"/>
+          </p:cNvSpPr>
+          <p:nvPr>
+            <p:ph type="body"/>
+          </p:nvPr>
+        </p:nvSpPr>
+        <p:spPr>
+          <a:xfrm>
+            <a:off x="6231960" y="1604520"/>
+            <a:ext cx="5354280" cy="3977280"/>
+          </a:xfrm>
+          <a:prstGeom prst="rect">
+            <a:avLst/>
+          </a:prstGeom>
+        </p:spPr>
+        <p:txBody>
+          <a:bodyPr lIns="0" rIns="0" tIns="0" bIns="0">
+            <a:normAutofit/>
+          </a:bodyPr>
+          <a:p>
+            <a:endParaRPr b="0" lang="pt-PT" sz="3200" spc="-1" strike="noStrike">
+              <a:latin typeface="Arial"/>
+            </a:endParaRPr>
+          </a:p>
+        </p:txBody>
+      </p:sp>
+    </p:spTree>
+  </p:cSld>
+</p:sldLayout>
+</file>
+
+<file path=ppt/slideLayouts/slideLayout29.xml><?xml version="1.0" encoding="utf-8"?>
+<p:sldLayout xmlns:a="http://schemas.openxmlformats.org/drawingml/2006/main" xmlns:p="http://schemas.openxmlformats.org/presentationml/2006/main" xmlns:r="http://schemas.openxmlformats.org/officeDocument/2006/relationships" xmlns:p14="http://schemas.microsoft.com/office/powerpoint/2010/main" xmlns:p15="http://schemas.microsoft.com/office/powerpoint/2012/main" xmlns:mc="http://schemas.openxmlformats.org/markup-compatibility/2006" type="titleOnly" preserve="1">
+  <p:cSld name="Title Only">
+    <p:spTree>
+      <p:nvGrpSpPr>
+        <p:cNvPr id="1" name=""/>
+        <p:cNvGrpSpPr/>
+        <p:nvPr/>
+      </p:nvGrpSpPr>
+      <p:grpSpPr>
+        <a:xfrm>
+          <a:off x="0" y="0"/>
+          <a:ext cx="0" cy="0"/>
+          <a:chOff x="0" y="0"/>
+          <a:chExt cx="0" cy="0"/>
+        </a:xfrm>
+      </p:grpSpPr>
+      <p:sp>
+        <p:nvSpPr>
+          <p:cNvPr id="85" name="PlaceHolder 1"/>
+          <p:cNvSpPr>
+            <a:spLocks noGrp="1"/>
+          </p:cNvSpPr>
+          <p:nvPr>
+            <p:ph type="title"/>
+          </p:nvPr>
+        </p:nvSpPr>
+        <p:spPr>
+          <a:xfrm>
+            <a:off x="609480" y="273600"/>
+            <a:ext cx="10972440" cy="1144800"/>
+          </a:xfrm>
+          <a:prstGeom prst="rect">
+            <a:avLst/>
+          </a:prstGeom>
+        </p:spPr>
+        <p:txBody>
+          <a:bodyPr lIns="0" rIns="0" tIns="0" bIns="0" anchor="ctr">
+            <a:noAutofit/>
+          </a:bodyPr>
+          <a:p>
+            <a:pPr algn="ctr"/>
+            <a:endParaRPr b="0" lang="pt-PT" sz="4400" spc="-1" strike="noStrike">
+              <a:latin typeface="Arial"/>
+            </a:endParaRPr>
+          </a:p>
+        </p:txBody>
+      </p:sp>
+    </p:spTree>
+  </p:cSld>
+</p:sldLayout>
+</file>
+
 <file path=ppt/slideLayouts/slideLayout3.xml><?xml version="1.0" encoding="utf-8"?>
 <p:sldLayout xmlns:a="http://schemas.openxmlformats.org/drawingml/2006/main" xmlns:p="http://schemas.openxmlformats.org/presentationml/2006/main" xmlns:r="http://schemas.openxmlformats.org/officeDocument/2006/relationships" xmlns:p14="http://schemas.microsoft.com/office/powerpoint/2010/main" xmlns:p15="http://schemas.microsoft.com/office/powerpoint/2012/main" xmlns:mc="http://schemas.openxmlformats.org/markup-compatibility/2006" type="obj" preserve="1">
   <p:cSld name="Title, Content">
@@ -2065,6 +2421,1007 @@
           <a:xfrm>
             <a:off x="609480" y="1604520"/>
             <a:ext cx="10972440" cy="3977280"/>
+          </a:xfrm>
+          <a:prstGeom prst="rect">
+            <a:avLst/>
+          </a:prstGeom>
+        </p:spPr>
+        <p:txBody>
+          <a:bodyPr lIns="0" rIns="0" tIns="0" bIns="0">
+            <a:normAutofit/>
+          </a:bodyPr>
+          <a:p>
+            <a:endParaRPr b="0" lang="pt-PT" sz="3200" spc="-1" strike="noStrike">
+              <a:latin typeface="Arial"/>
+            </a:endParaRPr>
+          </a:p>
+        </p:txBody>
+      </p:sp>
+    </p:spTree>
+  </p:cSld>
+</p:sldLayout>
+</file>
+
+<file path=ppt/slideLayouts/slideLayout30.xml><?xml version="1.0" encoding="utf-8"?>
+<p:sldLayout xmlns:a="http://schemas.openxmlformats.org/drawingml/2006/main" xmlns:p="http://schemas.openxmlformats.org/presentationml/2006/main" xmlns:r="http://schemas.openxmlformats.org/officeDocument/2006/relationships" xmlns:p14="http://schemas.microsoft.com/office/powerpoint/2010/main" xmlns:p15="http://schemas.microsoft.com/office/powerpoint/2012/main" xmlns:mc="http://schemas.openxmlformats.org/markup-compatibility/2006" type="objOnly" preserve="1">
+  <p:cSld name="Centered Text">
+    <p:spTree>
+      <p:nvGrpSpPr>
+        <p:cNvPr id="1" name=""/>
+        <p:cNvGrpSpPr/>
+        <p:nvPr/>
+      </p:nvGrpSpPr>
+      <p:grpSpPr>
+        <a:xfrm>
+          <a:off x="0" y="0"/>
+          <a:ext cx="0" cy="0"/>
+          <a:chOff x="0" y="0"/>
+          <a:chExt cx="0" cy="0"/>
+        </a:xfrm>
+      </p:grpSpPr>
+      <p:sp>
+        <p:nvSpPr>
+          <p:cNvPr id="86" name="PlaceHolder 1"/>
+          <p:cNvSpPr>
+            <a:spLocks noGrp="1"/>
+          </p:cNvSpPr>
+          <p:nvPr>
+            <p:ph type="subTitle"/>
+          </p:nvPr>
+        </p:nvSpPr>
+        <p:spPr>
+          <a:xfrm>
+            <a:off x="609480" y="273600"/>
+            <a:ext cx="10972440" cy="5307840"/>
+          </a:xfrm>
+          <a:prstGeom prst="rect">
+            <a:avLst/>
+          </a:prstGeom>
+        </p:spPr>
+        <p:txBody>
+          <a:bodyPr lIns="0" rIns="0" tIns="0" bIns="0" anchor="ctr">
+            <a:noAutofit/>
+          </a:bodyPr>
+          <a:p>
+            <a:pPr algn="ctr"/>
+            <a:endParaRPr b="0" lang="pt-PT" sz="3200" spc="-1" strike="noStrike">
+              <a:latin typeface="Arial"/>
+            </a:endParaRPr>
+          </a:p>
+        </p:txBody>
+      </p:sp>
+    </p:spTree>
+  </p:cSld>
+</p:sldLayout>
+</file>
+
+<file path=ppt/slideLayouts/slideLayout31.xml><?xml version="1.0" encoding="utf-8"?>
+<p:sldLayout xmlns:a="http://schemas.openxmlformats.org/drawingml/2006/main" xmlns:p="http://schemas.openxmlformats.org/presentationml/2006/main" xmlns:r="http://schemas.openxmlformats.org/officeDocument/2006/relationships" xmlns:p14="http://schemas.microsoft.com/office/powerpoint/2010/main" xmlns:p15="http://schemas.microsoft.com/office/powerpoint/2012/main" xmlns:mc="http://schemas.openxmlformats.org/markup-compatibility/2006" type="twoObjAndObj" preserve="1">
+  <p:cSld name="Title, 2 Content and Content">
+    <p:spTree>
+      <p:nvGrpSpPr>
+        <p:cNvPr id="1" name=""/>
+        <p:cNvGrpSpPr/>
+        <p:nvPr/>
+      </p:nvGrpSpPr>
+      <p:grpSpPr>
+        <a:xfrm>
+          <a:off x="0" y="0"/>
+          <a:ext cx="0" cy="0"/>
+          <a:chOff x="0" y="0"/>
+          <a:chExt cx="0" cy="0"/>
+        </a:xfrm>
+      </p:grpSpPr>
+      <p:sp>
+        <p:nvSpPr>
+          <p:cNvPr id="87" name="PlaceHolder 1"/>
+          <p:cNvSpPr>
+            <a:spLocks noGrp="1"/>
+          </p:cNvSpPr>
+          <p:nvPr>
+            <p:ph type="title"/>
+          </p:nvPr>
+        </p:nvSpPr>
+        <p:spPr>
+          <a:xfrm>
+            <a:off x="609480" y="273600"/>
+            <a:ext cx="10972440" cy="1144800"/>
+          </a:xfrm>
+          <a:prstGeom prst="rect">
+            <a:avLst/>
+          </a:prstGeom>
+        </p:spPr>
+        <p:txBody>
+          <a:bodyPr lIns="0" rIns="0" tIns="0" bIns="0" anchor="ctr">
+            <a:noAutofit/>
+          </a:bodyPr>
+          <a:p>
+            <a:pPr algn="ctr"/>
+            <a:endParaRPr b="0" lang="pt-PT" sz="4400" spc="-1" strike="noStrike">
+              <a:latin typeface="Arial"/>
+            </a:endParaRPr>
+          </a:p>
+        </p:txBody>
+      </p:sp>
+      <p:sp>
+        <p:nvSpPr>
+          <p:cNvPr id="88" name="PlaceHolder 2"/>
+          <p:cNvSpPr>
+            <a:spLocks noGrp="1"/>
+          </p:cNvSpPr>
+          <p:nvPr>
+            <p:ph type="body"/>
+          </p:nvPr>
+        </p:nvSpPr>
+        <p:spPr>
+          <a:xfrm>
+            <a:off x="609480" y="1604520"/>
+            <a:ext cx="5354280" cy="1896840"/>
+          </a:xfrm>
+          <a:prstGeom prst="rect">
+            <a:avLst/>
+          </a:prstGeom>
+        </p:spPr>
+        <p:txBody>
+          <a:bodyPr lIns="0" rIns="0" tIns="0" bIns="0">
+            <a:normAutofit/>
+          </a:bodyPr>
+          <a:p>
+            <a:endParaRPr b="0" lang="pt-PT" sz="3200" spc="-1" strike="noStrike">
+              <a:latin typeface="Arial"/>
+            </a:endParaRPr>
+          </a:p>
+        </p:txBody>
+      </p:sp>
+      <p:sp>
+        <p:nvSpPr>
+          <p:cNvPr id="89" name="PlaceHolder 3"/>
+          <p:cNvSpPr>
+            <a:spLocks noGrp="1"/>
+          </p:cNvSpPr>
+          <p:nvPr>
+            <p:ph type="body"/>
+          </p:nvPr>
+        </p:nvSpPr>
+        <p:spPr>
+          <a:xfrm>
+            <a:off x="6231960" y="1604520"/>
+            <a:ext cx="5354280" cy="3977280"/>
+          </a:xfrm>
+          <a:prstGeom prst="rect">
+            <a:avLst/>
+          </a:prstGeom>
+        </p:spPr>
+        <p:txBody>
+          <a:bodyPr lIns="0" rIns="0" tIns="0" bIns="0">
+            <a:normAutofit/>
+          </a:bodyPr>
+          <a:p>
+            <a:endParaRPr b="0" lang="pt-PT" sz="3200" spc="-1" strike="noStrike">
+              <a:latin typeface="Arial"/>
+            </a:endParaRPr>
+          </a:p>
+        </p:txBody>
+      </p:sp>
+      <p:sp>
+        <p:nvSpPr>
+          <p:cNvPr id="90" name="PlaceHolder 4"/>
+          <p:cNvSpPr>
+            <a:spLocks noGrp="1"/>
+          </p:cNvSpPr>
+          <p:nvPr>
+            <p:ph type="body"/>
+          </p:nvPr>
+        </p:nvSpPr>
+        <p:spPr>
+          <a:xfrm>
+            <a:off x="609480" y="3682080"/>
+            <a:ext cx="5354280" cy="1896840"/>
+          </a:xfrm>
+          <a:prstGeom prst="rect">
+            <a:avLst/>
+          </a:prstGeom>
+        </p:spPr>
+        <p:txBody>
+          <a:bodyPr lIns="0" rIns="0" tIns="0" bIns="0">
+            <a:normAutofit/>
+          </a:bodyPr>
+          <a:p>
+            <a:endParaRPr b="0" lang="pt-PT" sz="3200" spc="-1" strike="noStrike">
+              <a:latin typeface="Arial"/>
+            </a:endParaRPr>
+          </a:p>
+        </p:txBody>
+      </p:sp>
+    </p:spTree>
+  </p:cSld>
+</p:sldLayout>
+</file>
+
+<file path=ppt/slideLayouts/slideLayout32.xml><?xml version="1.0" encoding="utf-8"?>
+<p:sldLayout xmlns:a="http://schemas.openxmlformats.org/drawingml/2006/main" xmlns:p="http://schemas.openxmlformats.org/presentationml/2006/main" xmlns:r="http://schemas.openxmlformats.org/officeDocument/2006/relationships" xmlns:p14="http://schemas.microsoft.com/office/powerpoint/2010/main" xmlns:p15="http://schemas.microsoft.com/office/powerpoint/2012/main" xmlns:mc="http://schemas.openxmlformats.org/markup-compatibility/2006" type="objAndTwoObj" preserve="1">
+  <p:cSld name="Title Content and 2 Content">
+    <p:spTree>
+      <p:nvGrpSpPr>
+        <p:cNvPr id="1" name=""/>
+        <p:cNvGrpSpPr/>
+        <p:nvPr/>
+      </p:nvGrpSpPr>
+      <p:grpSpPr>
+        <a:xfrm>
+          <a:off x="0" y="0"/>
+          <a:ext cx="0" cy="0"/>
+          <a:chOff x="0" y="0"/>
+          <a:chExt cx="0" cy="0"/>
+        </a:xfrm>
+      </p:grpSpPr>
+      <p:sp>
+        <p:nvSpPr>
+          <p:cNvPr id="91" name="PlaceHolder 1"/>
+          <p:cNvSpPr>
+            <a:spLocks noGrp="1"/>
+          </p:cNvSpPr>
+          <p:nvPr>
+            <p:ph type="title"/>
+          </p:nvPr>
+        </p:nvSpPr>
+        <p:spPr>
+          <a:xfrm>
+            <a:off x="609480" y="273600"/>
+            <a:ext cx="10972440" cy="1144800"/>
+          </a:xfrm>
+          <a:prstGeom prst="rect">
+            <a:avLst/>
+          </a:prstGeom>
+        </p:spPr>
+        <p:txBody>
+          <a:bodyPr lIns="0" rIns="0" tIns="0" bIns="0" anchor="ctr">
+            <a:noAutofit/>
+          </a:bodyPr>
+          <a:p>
+            <a:pPr algn="ctr"/>
+            <a:endParaRPr b="0" lang="pt-PT" sz="4400" spc="-1" strike="noStrike">
+              <a:latin typeface="Arial"/>
+            </a:endParaRPr>
+          </a:p>
+        </p:txBody>
+      </p:sp>
+      <p:sp>
+        <p:nvSpPr>
+          <p:cNvPr id="92" name="PlaceHolder 2"/>
+          <p:cNvSpPr>
+            <a:spLocks noGrp="1"/>
+          </p:cNvSpPr>
+          <p:nvPr>
+            <p:ph type="body"/>
+          </p:nvPr>
+        </p:nvSpPr>
+        <p:spPr>
+          <a:xfrm>
+            <a:off x="609480" y="1604520"/>
+            <a:ext cx="5354280" cy="3977280"/>
+          </a:xfrm>
+          <a:prstGeom prst="rect">
+            <a:avLst/>
+          </a:prstGeom>
+        </p:spPr>
+        <p:txBody>
+          <a:bodyPr lIns="0" rIns="0" tIns="0" bIns="0">
+            <a:normAutofit/>
+          </a:bodyPr>
+          <a:p>
+            <a:endParaRPr b="0" lang="pt-PT" sz="3200" spc="-1" strike="noStrike">
+              <a:latin typeface="Arial"/>
+            </a:endParaRPr>
+          </a:p>
+        </p:txBody>
+      </p:sp>
+      <p:sp>
+        <p:nvSpPr>
+          <p:cNvPr id="93" name="PlaceHolder 3"/>
+          <p:cNvSpPr>
+            <a:spLocks noGrp="1"/>
+          </p:cNvSpPr>
+          <p:nvPr>
+            <p:ph type="body"/>
+          </p:nvPr>
+        </p:nvSpPr>
+        <p:spPr>
+          <a:xfrm>
+            <a:off x="6231960" y="1604520"/>
+            <a:ext cx="5354280" cy="1896840"/>
+          </a:xfrm>
+          <a:prstGeom prst="rect">
+            <a:avLst/>
+          </a:prstGeom>
+        </p:spPr>
+        <p:txBody>
+          <a:bodyPr lIns="0" rIns="0" tIns="0" bIns="0">
+            <a:normAutofit/>
+          </a:bodyPr>
+          <a:p>
+            <a:endParaRPr b="0" lang="pt-PT" sz="3200" spc="-1" strike="noStrike">
+              <a:latin typeface="Arial"/>
+            </a:endParaRPr>
+          </a:p>
+        </p:txBody>
+      </p:sp>
+      <p:sp>
+        <p:nvSpPr>
+          <p:cNvPr id="94" name="PlaceHolder 4"/>
+          <p:cNvSpPr>
+            <a:spLocks noGrp="1"/>
+          </p:cNvSpPr>
+          <p:nvPr>
+            <p:ph type="body"/>
+          </p:nvPr>
+        </p:nvSpPr>
+        <p:spPr>
+          <a:xfrm>
+            <a:off x="6231960" y="3682080"/>
+            <a:ext cx="5354280" cy="1896840"/>
+          </a:xfrm>
+          <a:prstGeom prst="rect">
+            <a:avLst/>
+          </a:prstGeom>
+        </p:spPr>
+        <p:txBody>
+          <a:bodyPr lIns="0" rIns="0" tIns="0" bIns="0">
+            <a:normAutofit/>
+          </a:bodyPr>
+          <a:p>
+            <a:endParaRPr b="0" lang="pt-PT" sz="3200" spc="-1" strike="noStrike">
+              <a:latin typeface="Arial"/>
+            </a:endParaRPr>
+          </a:p>
+        </p:txBody>
+      </p:sp>
+    </p:spTree>
+  </p:cSld>
+</p:sldLayout>
+</file>
+
+<file path=ppt/slideLayouts/slideLayout33.xml><?xml version="1.0" encoding="utf-8"?>
+<p:sldLayout xmlns:a="http://schemas.openxmlformats.org/drawingml/2006/main" xmlns:p="http://schemas.openxmlformats.org/presentationml/2006/main" xmlns:r="http://schemas.openxmlformats.org/officeDocument/2006/relationships" xmlns:p14="http://schemas.microsoft.com/office/powerpoint/2010/main" xmlns:p15="http://schemas.microsoft.com/office/powerpoint/2012/main" xmlns:mc="http://schemas.openxmlformats.org/markup-compatibility/2006" type="twoObjOverTx" preserve="1">
+  <p:cSld name="Title, 2 Content over Content">
+    <p:spTree>
+      <p:nvGrpSpPr>
+        <p:cNvPr id="1" name=""/>
+        <p:cNvGrpSpPr/>
+        <p:nvPr/>
+      </p:nvGrpSpPr>
+      <p:grpSpPr>
+        <a:xfrm>
+          <a:off x="0" y="0"/>
+          <a:ext cx="0" cy="0"/>
+          <a:chOff x="0" y="0"/>
+          <a:chExt cx="0" cy="0"/>
+        </a:xfrm>
+      </p:grpSpPr>
+      <p:sp>
+        <p:nvSpPr>
+          <p:cNvPr id="95" name="PlaceHolder 1"/>
+          <p:cNvSpPr>
+            <a:spLocks noGrp="1"/>
+          </p:cNvSpPr>
+          <p:nvPr>
+            <p:ph type="title"/>
+          </p:nvPr>
+        </p:nvSpPr>
+        <p:spPr>
+          <a:xfrm>
+            <a:off x="609480" y="273600"/>
+            <a:ext cx="10972440" cy="1144800"/>
+          </a:xfrm>
+          <a:prstGeom prst="rect">
+            <a:avLst/>
+          </a:prstGeom>
+        </p:spPr>
+        <p:txBody>
+          <a:bodyPr lIns="0" rIns="0" tIns="0" bIns="0" anchor="ctr">
+            <a:noAutofit/>
+          </a:bodyPr>
+          <a:p>
+            <a:pPr algn="ctr"/>
+            <a:endParaRPr b="0" lang="pt-PT" sz="4400" spc="-1" strike="noStrike">
+              <a:latin typeface="Arial"/>
+            </a:endParaRPr>
+          </a:p>
+        </p:txBody>
+      </p:sp>
+      <p:sp>
+        <p:nvSpPr>
+          <p:cNvPr id="96" name="PlaceHolder 2"/>
+          <p:cNvSpPr>
+            <a:spLocks noGrp="1"/>
+          </p:cNvSpPr>
+          <p:nvPr>
+            <p:ph type="body"/>
+          </p:nvPr>
+        </p:nvSpPr>
+        <p:spPr>
+          <a:xfrm>
+            <a:off x="609480" y="1604520"/>
+            <a:ext cx="5354280" cy="1896840"/>
+          </a:xfrm>
+          <a:prstGeom prst="rect">
+            <a:avLst/>
+          </a:prstGeom>
+        </p:spPr>
+        <p:txBody>
+          <a:bodyPr lIns="0" rIns="0" tIns="0" bIns="0">
+            <a:normAutofit/>
+          </a:bodyPr>
+          <a:p>
+            <a:endParaRPr b="0" lang="pt-PT" sz="3200" spc="-1" strike="noStrike">
+              <a:latin typeface="Arial"/>
+            </a:endParaRPr>
+          </a:p>
+        </p:txBody>
+      </p:sp>
+      <p:sp>
+        <p:nvSpPr>
+          <p:cNvPr id="97" name="PlaceHolder 3"/>
+          <p:cNvSpPr>
+            <a:spLocks noGrp="1"/>
+          </p:cNvSpPr>
+          <p:nvPr>
+            <p:ph type="body"/>
+          </p:nvPr>
+        </p:nvSpPr>
+        <p:spPr>
+          <a:xfrm>
+            <a:off x="6231960" y="1604520"/>
+            <a:ext cx="5354280" cy="1896840"/>
+          </a:xfrm>
+          <a:prstGeom prst="rect">
+            <a:avLst/>
+          </a:prstGeom>
+        </p:spPr>
+        <p:txBody>
+          <a:bodyPr lIns="0" rIns="0" tIns="0" bIns="0">
+            <a:normAutofit/>
+          </a:bodyPr>
+          <a:p>
+            <a:endParaRPr b="0" lang="pt-PT" sz="3200" spc="-1" strike="noStrike">
+              <a:latin typeface="Arial"/>
+            </a:endParaRPr>
+          </a:p>
+        </p:txBody>
+      </p:sp>
+      <p:sp>
+        <p:nvSpPr>
+          <p:cNvPr id="98" name="PlaceHolder 4"/>
+          <p:cNvSpPr>
+            <a:spLocks noGrp="1"/>
+          </p:cNvSpPr>
+          <p:nvPr>
+            <p:ph type="body"/>
+          </p:nvPr>
+        </p:nvSpPr>
+        <p:spPr>
+          <a:xfrm>
+            <a:off x="609480" y="3682080"/>
+            <a:ext cx="10972440" cy="1896840"/>
+          </a:xfrm>
+          <a:prstGeom prst="rect">
+            <a:avLst/>
+          </a:prstGeom>
+        </p:spPr>
+        <p:txBody>
+          <a:bodyPr lIns="0" rIns="0" tIns="0" bIns="0">
+            <a:normAutofit/>
+          </a:bodyPr>
+          <a:p>
+            <a:endParaRPr b="0" lang="pt-PT" sz="3200" spc="-1" strike="noStrike">
+              <a:latin typeface="Arial"/>
+            </a:endParaRPr>
+          </a:p>
+        </p:txBody>
+      </p:sp>
+    </p:spTree>
+  </p:cSld>
+</p:sldLayout>
+</file>
+
+<file path=ppt/slideLayouts/slideLayout34.xml><?xml version="1.0" encoding="utf-8"?>
+<p:sldLayout xmlns:a="http://schemas.openxmlformats.org/drawingml/2006/main" xmlns:p="http://schemas.openxmlformats.org/presentationml/2006/main" xmlns:r="http://schemas.openxmlformats.org/officeDocument/2006/relationships" xmlns:p14="http://schemas.microsoft.com/office/powerpoint/2010/main" xmlns:p15="http://schemas.microsoft.com/office/powerpoint/2012/main" xmlns:mc="http://schemas.openxmlformats.org/markup-compatibility/2006" type="objOverTx" preserve="1">
+  <p:cSld name="Title, Content over Content">
+    <p:spTree>
+      <p:nvGrpSpPr>
+        <p:cNvPr id="1" name=""/>
+        <p:cNvGrpSpPr/>
+        <p:nvPr/>
+      </p:nvGrpSpPr>
+      <p:grpSpPr>
+        <a:xfrm>
+          <a:off x="0" y="0"/>
+          <a:ext cx="0" cy="0"/>
+          <a:chOff x="0" y="0"/>
+          <a:chExt cx="0" cy="0"/>
+        </a:xfrm>
+      </p:grpSpPr>
+      <p:sp>
+        <p:nvSpPr>
+          <p:cNvPr id="99" name="PlaceHolder 1"/>
+          <p:cNvSpPr>
+            <a:spLocks noGrp="1"/>
+          </p:cNvSpPr>
+          <p:nvPr>
+            <p:ph type="title"/>
+          </p:nvPr>
+        </p:nvSpPr>
+        <p:spPr>
+          <a:xfrm>
+            <a:off x="609480" y="273600"/>
+            <a:ext cx="10972440" cy="1144800"/>
+          </a:xfrm>
+          <a:prstGeom prst="rect">
+            <a:avLst/>
+          </a:prstGeom>
+        </p:spPr>
+        <p:txBody>
+          <a:bodyPr lIns="0" rIns="0" tIns="0" bIns="0" anchor="ctr">
+            <a:noAutofit/>
+          </a:bodyPr>
+          <a:p>
+            <a:pPr algn="ctr"/>
+            <a:endParaRPr b="0" lang="pt-PT" sz="4400" spc="-1" strike="noStrike">
+              <a:latin typeface="Arial"/>
+            </a:endParaRPr>
+          </a:p>
+        </p:txBody>
+      </p:sp>
+      <p:sp>
+        <p:nvSpPr>
+          <p:cNvPr id="100" name="PlaceHolder 2"/>
+          <p:cNvSpPr>
+            <a:spLocks noGrp="1"/>
+          </p:cNvSpPr>
+          <p:nvPr>
+            <p:ph type="body"/>
+          </p:nvPr>
+        </p:nvSpPr>
+        <p:spPr>
+          <a:xfrm>
+            <a:off x="609480" y="1604520"/>
+            <a:ext cx="10972440" cy="1896840"/>
+          </a:xfrm>
+          <a:prstGeom prst="rect">
+            <a:avLst/>
+          </a:prstGeom>
+        </p:spPr>
+        <p:txBody>
+          <a:bodyPr lIns="0" rIns="0" tIns="0" bIns="0">
+            <a:normAutofit/>
+          </a:bodyPr>
+          <a:p>
+            <a:endParaRPr b="0" lang="pt-PT" sz="3200" spc="-1" strike="noStrike">
+              <a:latin typeface="Arial"/>
+            </a:endParaRPr>
+          </a:p>
+        </p:txBody>
+      </p:sp>
+      <p:sp>
+        <p:nvSpPr>
+          <p:cNvPr id="101" name="PlaceHolder 3"/>
+          <p:cNvSpPr>
+            <a:spLocks noGrp="1"/>
+          </p:cNvSpPr>
+          <p:nvPr>
+            <p:ph type="body"/>
+          </p:nvPr>
+        </p:nvSpPr>
+        <p:spPr>
+          <a:xfrm>
+            <a:off x="609480" y="3682080"/>
+            <a:ext cx="10972440" cy="1896840"/>
+          </a:xfrm>
+          <a:prstGeom prst="rect">
+            <a:avLst/>
+          </a:prstGeom>
+        </p:spPr>
+        <p:txBody>
+          <a:bodyPr lIns="0" rIns="0" tIns="0" bIns="0">
+            <a:normAutofit/>
+          </a:bodyPr>
+          <a:p>
+            <a:endParaRPr b="0" lang="pt-PT" sz="3200" spc="-1" strike="noStrike">
+              <a:latin typeface="Arial"/>
+            </a:endParaRPr>
+          </a:p>
+        </p:txBody>
+      </p:sp>
+    </p:spTree>
+  </p:cSld>
+</p:sldLayout>
+</file>
+
+<file path=ppt/slideLayouts/slideLayout35.xml><?xml version="1.0" encoding="utf-8"?>
+<p:sldLayout xmlns:a="http://schemas.openxmlformats.org/drawingml/2006/main" xmlns:p="http://schemas.openxmlformats.org/presentationml/2006/main" xmlns:r="http://schemas.openxmlformats.org/officeDocument/2006/relationships" xmlns:p14="http://schemas.microsoft.com/office/powerpoint/2010/main" xmlns:p15="http://schemas.microsoft.com/office/powerpoint/2012/main" xmlns:mc="http://schemas.openxmlformats.org/markup-compatibility/2006" type="fourObj" preserve="1">
+  <p:cSld name="Title, 4 Content">
+    <p:spTree>
+      <p:nvGrpSpPr>
+        <p:cNvPr id="1" name=""/>
+        <p:cNvGrpSpPr/>
+        <p:nvPr/>
+      </p:nvGrpSpPr>
+      <p:grpSpPr>
+        <a:xfrm>
+          <a:off x="0" y="0"/>
+          <a:ext cx="0" cy="0"/>
+          <a:chOff x="0" y="0"/>
+          <a:chExt cx="0" cy="0"/>
+        </a:xfrm>
+      </p:grpSpPr>
+      <p:sp>
+        <p:nvSpPr>
+          <p:cNvPr id="102" name="PlaceHolder 1"/>
+          <p:cNvSpPr>
+            <a:spLocks noGrp="1"/>
+          </p:cNvSpPr>
+          <p:nvPr>
+            <p:ph type="title"/>
+          </p:nvPr>
+        </p:nvSpPr>
+        <p:spPr>
+          <a:xfrm>
+            <a:off x="609480" y="273600"/>
+            <a:ext cx="10972440" cy="1144800"/>
+          </a:xfrm>
+          <a:prstGeom prst="rect">
+            <a:avLst/>
+          </a:prstGeom>
+        </p:spPr>
+        <p:txBody>
+          <a:bodyPr lIns="0" rIns="0" tIns="0" bIns="0" anchor="ctr">
+            <a:noAutofit/>
+          </a:bodyPr>
+          <a:p>
+            <a:pPr algn="ctr"/>
+            <a:endParaRPr b="0" lang="pt-PT" sz="4400" spc="-1" strike="noStrike">
+              <a:latin typeface="Arial"/>
+            </a:endParaRPr>
+          </a:p>
+        </p:txBody>
+      </p:sp>
+      <p:sp>
+        <p:nvSpPr>
+          <p:cNvPr id="103" name="PlaceHolder 2"/>
+          <p:cNvSpPr>
+            <a:spLocks noGrp="1"/>
+          </p:cNvSpPr>
+          <p:nvPr>
+            <p:ph type="body"/>
+          </p:nvPr>
+        </p:nvSpPr>
+        <p:spPr>
+          <a:xfrm>
+            <a:off x="609480" y="1604520"/>
+            <a:ext cx="5354280" cy="1896840"/>
+          </a:xfrm>
+          <a:prstGeom prst="rect">
+            <a:avLst/>
+          </a:prstGeom>
+        </p:spPr>
+        <p:txBody>
+          <a:bodyPr lIns="0" rIns="0" tIns="0" bIns="0">
+            <a:normAutofit/>
+          </a:bodyPr>
+          <a:p>
+            <a:endParaRPr b="0" lang="pt-PT" sz="3200" spc="-1" strike="noStrike">
+              <a:latin typeface="Arial"/>
+            </a:endParaRPr>
+          </a:p>
+        </p:txBody>
+      </p:sp>
+      <p:sp>
+        <p:nvSpPr>
+          <p:cNvPr id="104" name="PlaceHolder 3"/>
+          <p:cNvSpPr>
+            <a:spLocks noGrp="1"/>
+          </p:cNvSpPr>
+          <p:nvPr>
+            <p:ph type="body"/>
+          </p:nvPr>
+        </p:nvSpPr>
+        <p:spPr>
+          <a:xfrm>
+            <a:off x="6231960" y="1604520"/>
+            <a:ext cx="5354280" cy="1896840"/>
+          </a:xfrm>
+          <a:prstGeom prst="rect">
+            <a:avLst/>
+          </a:prstGeom>
+        </p:spPr>
+        <p:txBody>
+          <a:bodyPr lIns="0" rIns="0" tIns="0" bIns="0">
+            <a:normAutofit/>
+          </a:bodyPr>
+          <a:p>
+            <a:endParaRPr b="0" lang="pt-PT" sz="3200" spc="-1" strike="noStrike">
+              <a:latin typeface="Arial"/>
+            </a:endParaRPr>
+          </a:p>
+        </p:txBody>
+      </p:sp>
+      <p:sp>
+        <p:nvSpPr>
+          <p:cNvPr id="105" name="PlaceHolder 4"/>
+          <p:cNvSpPr>
+            <a:spLocks noGrp="1"/>
+          </p:cNvSpPr>
+          <p:nvPr>
+            <p:ph type="body"/>
+          </p:nvPr>
+        </p:nvSpPr>
+        <p:spPr>
+          <a:xfrm>
+            <a:off x="609480" y="3682080"/>
+            <a:ext cx="5354280" cy="1896840"/>
+          </a:xfrm>
+          <a:prstGeom prst="rect">
+            <a:avLst/>
+          </a:prstGeom>
+        </p:spPr>
+        <p:txBody>
+          <a:bodyPr lIns="0" rIns="0" tIns="0" bIns="0">
+            <a:normAutofit/>
+          </a:bodyPr>
+          <a:p>
+            <a:endParaRPr b="0" lang="pt-PT" sz="3200" spc="-1" strike="noStrike">
+              <a:latin typeface="Arial"/>
+            </a:endParaRPr>
+          </a:p>
+        </p:txBody>
+      </p:sp>
+      <p:sp>
+        <p:nvSpPr>
+          <p:cNvPr id="106" name="PlaceHolder 5"/>
+          <p:cNvSpPr>
+            <a:spLocks noGrp="1"/>
+          </p:cNvSpPr>
+          <p:nvPr>
+            <p:ph type="body"/>
+          </p:nvPr>
+        </p:nvSpPr>
+        <p:spPr>
+          <a:xfrm>
+            <a:off x="6231960" y="3682080"/>
+            <a:ext cx="5354280" cy="1896840"/>
+          </a:xfrm>
+          <a:prstGeom prst="rect">
+            <a:avLst/>
+          </a:prstGeom>
+        </p:spPr>
+        <p:txBody>
+          <a:bodyPr lIns="0" rIns="0" tIns="0" bIns="0">
+            <a:normAutofit/>
+          </a:bodyPr>
+          <a:p>
+            <a:endParaRPr b="0" lang="pt-PT" sz="3200" spc="-1" strike="noStrike">
+              <a:latin typeface="Arial"/>
+            </a:endParaRPr>
+          </a:p>
+        </p:txBody>
+      </p:sp>
+    </p:spTree>
+  </p:cSld>
+</p:sldLayout>
+</file>
+
+<file path=ppt/slideLayouts/slideLayout36.xml><?xml version="1.0" encoding="utf-8"?>
+<p:sldLayout xmlns:a="http://schemas.openxmlformats.org/drawingml/2006/main" xmlns:p="http://schemas.openxmlformats.org/presentationml/2006/main" xmlns:r="http://schemas.openxmlformats.org/officeDocument/2006/relationships" xmlns:p14="http://schemas.microsoft.com/office/powerpoint/2010/main" xmlns:p15="http://schemas.microsoft.com/office/powerpoint/2012/main" xmlns:mc="http://schemas.openxmlformats.org/markup-compatibility/2006" type="blank" preserve="1">
+  <p:cSld name="Title, 6 Content">
+    <p:spTree>
+      <p:nvGrpSpPr>
+        <p:cNvPr id="1" name=""/>
+        <p:cNvGrpSpPr/>
+        <p:nvPr/>
+      </p:nvGrpSpPr>
+      <p:grpSpPr>
+        <a:xfrm>
+          <a:off x="0" y="0"/>
+          <a:ext cx="0" cy="0"/>
+          <a:chOff x="0" y="0"/>
+          <a:chExt cx="0" cy="0"/>
+        </a:xfrm>
+      </p:grpSpPr>
+      <p:sp>
+        <p:nvSpPr>
+          <p:cNvPr id="107" name="PlaceHolder 1"/>
+          <p:cNvSpPr>
+            <a:spLocks noGrp="1"/>
+          </p:cNvSpPr>
+          <p:nvPr>
+            <p:ph type="title"/>
+          </p:nvPr>
+        </p:nvSpPr>
+        <p:spPr>
+          <a:xfrm>
+            <a:off x="609480" y="273600"/>
+            <a:ext cx="10972440" cy="1144800"/>
+          </a:xfrm>
+          <a:prstGeom prst="rect">
+            <a:avLst/>
+          </a:prstGeom>
+        </p:spPr>
+        <p:txBody>
+          <a:bodyPr lIns="0" rIns="0" tIns="0" bIns="0" anchor="ctr">
+            <a:noAutofit/>
+          </a:bodyPr>
+          <a:p>
+            <a:pPr algn="ctr"/>
+            <a:endParaRPr b="0" lang="pt-PT" sz="4400" spc="-1" strike="noStrike">
+              <a:latin typeface="Arial"/>
+            </a:endParaRPr>
+          </a:p>
+        </p:txBody>
+      </p:sp>
+      <p:sp>
+        <p:nvSpPr>
+          <p:cNvPr id="108" name="PlaceHolder 2"/>
+          <p:cNvSpPr>
+            <a:spLocks noGrp="1"/>
+          </p:cNvSpPr>
+          <p:nvPr>
+            <p:ph type="body"/>
+          </p:nvPr>
+        </p:nvSpPr>
+        <p:spPr>
+          <a:xfrm>
+            <a:off x="609480" y="1604520"/>
+            <a:ext cx="3533040" cy="1896840"/>
+          </a:xfrm>
+          <a:prstGeom prst="rect">
+            <a:avLst/>
+          </a:prstGeom>
+        </p:spPr>
+        <p:txBody>
+          <a:bodyPr lIns="0" rIns="0" tIns="0" bIns="0">
+            <a:normAutofit/>
+          </a:bodyPr>
+          <a:p>
+            <a:endParaRPr b="0" lang="pt-PT" sz="3200" spc="-1" strike="noStrike">
+              <a:latin typeface="Arial"/>
+            </a:endParaRPr>
+          </a:p>
+        </p:txBody>
+      </p:sp>
+      <p:sp>
+        <p:nvSpPr>
+          <p:cNvPr id="109" name="PlaceHolder 3"/>
+          <p:cNvSpPr>
+            <a:spLocks noGrp="1"/>
+          </p:cNvSpPr>
+          <p:nvPr>
+            <p:ph type="body"/>
+          </p:nvPr>
+        </p:nvSpPr>
+        <p:spPr>
+          <a:xfrm>
+            <a:off x="4319640" y="1604520"/>
+            <a:ext cx="3533040" cy="1896840"/>
+          </a:xfrm>
+          <a:prstGeom prst="rect">
+            <a:avLst/>
+          </a:prstGeom>
+        </p:spPr>
+        <p:txBody>
+          <a:bodyPr lIns="0" rIns="0" tIns="0" bIns="0">
+            <a:normAutofit/>
+          </a:bodyPr>
+          <a:p>
+            <a:endParaRPr b="0" lang="pt-PT" sz="3200" spc="-1" strike="noStrike">
+              <a:latin typeface="Arial"/>
+            </a:endParaRPr>
+          </a:p>
+        </p:txBody>
+      </p:sp>
+      <p:sp>
+        <p:nvSpPr>
+          <p:cNvPr id="110" name="PlaceHolder 4"/>
+          <p:cNvSpPr>
+            <a:spLocks noGrp="1"/>
+          </p:cNvSpPr>
+          <p:nvPr>
+            <p:ph type="body"/>
+          </p:nvPr>
+        </p:nvSpPr>
+        <p:spPr>
+          <a:xfrm>
+            <a:off x="8029800" y="1604520"/>
+            <a:ext cx="3533040" cy="1896840"/>
+          </a:xfrm>
+          <a:prstGeom prst="rect">
+            <a:avLst/>
+          </a:prstGeom>
+        </p:spPr>
+        <p:txBody>
+          <a:bodyPr lIns="0" rIns="0" tIns="0" bIns="0">
+            <a:normAutofit/>
+          </a:bodyPr>
+          <a:p>
+            <a:endParaRPr b="0" lang="pt-PT" sz="3200" spc="-1" strike="noStrike">
+              <a:latin typeface="Arial"/>
+            </a:endParaRPr>
+          </a:p>
+        </p:txBody>
+      </p:sp>
+      <p:sp>
+        <p:nvSpPr>
+          <p:cNvPr id="111" name="PlaceHolder 5"/>
+          <p:cNvSpPr>
+            <a:spLocks noGrp="1"/>
+          </p:cNvSpPr>
+          <p:nvPr>
+            <p:ph type="body"/>
+          </p:nvPr>
+        </p:nvSpPr>
+        <p:spPr>
+          <a:xfrm>
+            <a:off x="609480" y="3682080"/>
+            <a:ext cx="3533040" cy="1896840"/>
+          </a:xfrm>
+          <a:prstGeom prst="rect">
+            <a:avLst/>
+          </a:prstGeom>
+        </p:spPr>
+        <p:txBody>
+          <a:bodyPr lIns="0" rIns="0" tIns="0" bIns="0">
+            <a:normAutofit/>
+          </a:bodyPr>
+          <a:p>
+            <a:endParaRPr b="0" lang="pt-PT" sz="3200" spc="-1" strike="noStrike">
+              <a:latin typeface="Arial"/>
+            </a:endParaRPr>
+          </a:p>
+        </p:txBody>
+      </p:sp>
+      <p:sp>
+        <p:nvSpPr>
+          <p:cNvPr id="112" name="PlaceHolder 6"/>
+          <p:cNvSpPr>
+            <a:spLocks noGrp="1"/>
+          </p:cNvSpPr>
+          <p:nvPr>
+            <p:ph type="body"/>
+          </p:nvPr>
+        </p:nvSpPr>
+        <p:spPr>
+          <a:xfrm>
+            <a:off x="4319640" y="3682080"/>
+            <a:ext cx="3533040" cy="1896840"/>
+          </a:xfrm>
+          <a:prstGeom prst="rect">
+            <a:avLst/>
+          </a:prstGeom>
+        </p:spPr>
+        <p:txBody>
+          <a:bodyPr lIns="0" rIns="0" tIns="0" bIns="0">
+            <a:normAutofit/>
+          </a:bodyPr>
+          <a:p>
+            <a:endParaRPr b="0" lang="pt-PT" sz="3200" spc="-1" strike="noStrike">
+              <a:latin typeface="Arial"/>
+            </a:endParaRPr>
+          </a:p>
+        </p:txBody>
+      </p:sp>
+      <p:sp>
+        <p:nvSpPr>
+          <p:cNvPr id="113" name="PlaceHolder 7"/>
+          <p:cNvSpPr>
+            <a:spLocks noGrp="1"/>
+          </p:cNvSpPr>
+          <p:nvPr>
+            <p:ph type="body"/>
+          </p:nvPr>
+        </p:nvSpPr>
+        <p:spPr>
+          <a:xfrm>
+            <a:off x="8029800" y="3682080"/>
+            <a:ext cx="3533040" cy="1896840"/>
           </a:xfrm>
           <a:prstGeom prst="rect">
             <a:avLst/>
@@ -2770,8 +4127,8 @@
         </p:nvSpPr>
         <p:spPr>
           <a:xfrm>
-            <a:off x="838080" y="365040"/>
-            <a:ext cx="10514880" cy="1324800"/>
+            <a:off x="609480" y="273600"/>
+            <a:ext cx="10972080" cy="1144440"/>
           </a:xfrm>
           <a:prstGeom prst="rect">
             <a:avLst/>
@@ -2807,7 +4164,7 @@
         <p:spPr>
           <a:xfrm>
             <a:off x="609480" y="1604520"/>
-            <a:ext cx="10972440" cy="3977280"/>
+            <a:ext cx="10972080" cy="3976920"/>
           </a:xfrm>
           <a:prstGeom prst="rect">
             <a:avLst/>
@@ -2830,12 +4187,12 @@
               <a:buChar char=""/>
             </a:pPr>
             <a:r>
-              <a:rPr b="0" lang="pt-PT" sz="3200" spc="-1" strike="noStrike">
+              <a:rPr b="0" lang="pt-PT" sz="1800" spc="-1" strike="noStrike">
                 <a:latin typeface="Arial"/>
               </a:rPr>
               <a:t>Clique para editar o formato de texto dos tópicos</a:t>
             </a:r>
-            <a:endParaRPr b="0" lang="pt-PT" sz="3200" spc="-1" strike="noStrike">
+            <a:endParaRPr b="0" lang="pt-PT" sz="1800" spc="-1" strike="noStrike">
               <a:latin typeface="Arial"/>
             </a:endParaRPr>
           </a:p>
@@ -2852,12 +4209,12 @@
               <a:buChar char=""/>
             </a:pPr>
             <a:r>
-              <a:rPr b="0" lang="pt-PT" sz="2800" spc="-1" strike="noStrike">
+              <a:rPr b="0" lang="pt-PT" sz="1800" spc="-1" strike="noStrike">
                 <a:latin typeface="Arial"/>
               </a:rPr>
               <a:t>Segundo nível de tópicos</a:t>
             </a:r>
-            <a:endParaRPr b="0" lang="pt-PT" sz="2800" spc="-1" strike="noStrike">
+            <a:endParaRPr b="0" lang="pt-PT" sz="1800" spc="-1" strike="noStrike">
               <a:latin typeface="Arial"/>
             </a:endParaRPr>
           </a:p>
@@ -2874,12 +4231,12 @@
               <a:buChar char=""/>
             </a:pPr>
             <a:r>
-              <a:rPr b="0" lang="pt-PT" sz="2400" spc="-1" strike="noStrike">
+              <a:rPr b="0" lang="pt-PT" sz="1800" spc="-1" strike="noStrike">
                 <a:latin typeface="Arial"/>
               </a:rPr>
               <a:t>Terceiro nível de tópicos</a:t>
             </a:r>
-            <a:endParaRPr b="0" lang="pt-PT" sz="2400" spc="-1" strike="noStrike">
+            <a:endParaRPr b="0" lang="pt-PT" sz="1800" spc="-1" strike="noStrike">
               <a:latin typeface="Arial"/>
             </a:endParaRPr>
           </a:p>
@@ -2896,12 +4253,12 @@
               <a:buChar char=""/>
             </a:pPr>
             <a:r>
-              <a:rPr b="0" lang="pt-PT" sz="2000" spc="-1" strike="noStrike">
+              <a:rPr b="0" lang="pt-PT" sz="1800" spc="-1" strike="noStrike">
                 <a:latin typeface="Arial"/>
               </a:rPr>
               <a:t>Quarto nível de tópicos</a:t>
             </a:r>
-            <a:endParaRPr b="0" lang="pt-PT" sz="2000" spc="-1" strike="noStrike">
+            <a:endParaRPr b="0" lang="pt-PT" sz="1800" spc="-1" strike="noStrike">
               <a:latin typeface="Arial"/>
             </a:endParaRPr>
           </a:p>
@@ -2918,12 +4275,12 @@
               <a:buChar char=""/>
             </a:pPr>
             <a:r>
-              <a:rPr b="0" lang="pt-PT" sz="2000" spc="-1" strike="noStrike">
+              <a:rPr b="0" lang="pt-PT" sz="1800" spc="-1" strike="noStrike">
                 <a:latin typeface="Arial"/>
               </a:rPr>
               <a:t>Quinto nível de tópicos</a:t>
             </a:r>
-            <a:endParaRPr b="0" lang="pt-PT" sz="2000" spc="-1" strike="noStrike">
+            <a:endParaRPr b="0" lang="pt-PT" sz="1800" spc="-1" strike="noStrike">
               <a:latin typeface="Arial"/>
             </a:endParaRPr>
           </a:p>
@@ -2940,12 +4297,12 @@
               <a:buChar char=""/>
             </a:pPr>
             <a:r>
-              <a:rPr b="0" lang="pt-PT" sz="2000" spc="-1" strike="noStrike">
+              <a:rPr b="0" lang="pt-PT" sz="1800" spc="-1" strike="noStrike">
                 <a:latin typeface="Arial"/>
               </a:rPr>
               <a:t>Sexto nível de tópicos</a:t>
             </a:r>
-            <a:endParaRPr b="0" lang="pt-PT" sz="2000" spc="-1" strike="noStrike">
+            <a:endParaRPr b="0" lang="pt-PT" sz="1800" spc="-1" strike="noStrike">
               <a:latin typeface="Arial"/>
             </a:endParaRPr>
           </a:p>
@@ -2962,12 +4319,12 @@
               <a:buChar char=""/>
             </a:pPr>
             <a:r>
-              <a:rPr b="0" lang="pt-PT" sz="2000" spc="-1" strike="noStrike">
+              <a:rPr b="0" lang="pt-PT" sz="1800" spc="-1" strike="noStrike">
                 <a:latin typeface="Arial"/>
               </a:rPr>
               <a:t>Sétimo nível de tópicos</a:t>
             </a:r>
-            <a:endParaRPr b="0" lang="pt-PT" sz="2000" spc="-1" strike="noStrike">
+            <a:endParaRPr b="0" lang="pt-PT" sz="1800" spc="-1" strike="noStrike">
               <a:latin typeface="Arial"/>
             </a:endParaRPr>
           </a:p>
@@ -3253,6 +4610,265 @@
 </p:sldMaster>
 </file>
 
+<file path=ppt/slideMasters/slideMaster3.xml><?xml version="1.0" encoding="utf-8"?>
+<p:sldMaster xmlns:a="http://schemas.openxmlformats.org/drawingml/2006/main" xmlns:p="http://schemas.openxmlformats.org/presentationml/2006/main" xmlns:r="http://schemas.openxmlformats.org/officeDocument/2006/relationships" xmlns:p14="http://schemas.microsoft.com/office/powerpoint/2010/main" xmlns:p15="http://schemas.microsoft.com/office/powerpoint/2012/main" xmlns:mc="http://schemas.openxmlformats.org/markup-compatibility/2006">
+  <p:cSld>
+    <p:bg>
+      <p:bgPr>
+        <a:solidFill>
+          <a:srgbClr val="ffffff"/>
+        </a:solidFill>
+      </p:bgPr>
+    </p:bg>
+    <p:spTree>
+      <p:nvGrpSpPr>
+        <p:cNvPr id="1" name=""/>
+        <p:cNvGrpSpPr/>
+        <p:nvPr/>
+      </p:nvGrpSpPr>
+      <p:grpSpPr>
+        <a:xfrm>
+          <a:off x="0" y="0"/>
+          <a:ext cx="0" cy="0"/>
+          <a:chOff x="0" y="0"/>
+          <a:chExt cx="0" cy="0"/>
+        </a:xfrm>
+      </p:grpSpPr>
+      <p:sp>
+        <p:nvSpPr>
+          <p:cNvPr id="76" name="PlaceHolder 1"/>
+          <p:cNvSpPr>
+            <a:spLocks noGrp="1"/>
+          </p:cNvSpPr>
+          <p:nvPr>
+            <p:ph type="title"/>
+          </p:nvPr>
+        </p:nvSpPr>
+        <p:spPr>
+          <a:xfrm>
+            <a:off x="609480" y="273600"/>
+            <a:ext cx="10972080" cy="1144440"/>
+          </a:xfrm>
+          <a:prstGeom prst="rect">
+            <a:avLst/>
+          </a:prstGeom>
+        </p:spPr>
+        <p:txBody>
+          <a:bodyPr lIns="0" rIns="0" tIns="0" bIns="0" anchor="ctr">
+            <a:noAutofit/>
+          </a:bodyPr>
+          <a:p>
+            <a:r>
+              <a:rPr b="0" lang="pt-PT" sz="1800" spc="-1" strike="noStrike">
+                <a:latin typeface="Arial"/>
+              </a:rPr>
+              <a:t>Clique para editar o formato do título</a:t>
+            </a:r>
+            <a:endParaRPr b="0" lang="pt-PT" sz="1800" spc="-1" strike="noStrike">
+              <a:latin typeface="Arial"/>
+            </a:endParaRPr>
+          </a:p>
+        </p:txBody>
+      </p:sp>
+      <p:sp>
+        <p:nvSpPr>
+          <p:cNvPr id="77" name="PlaceHolder 2"/>
+          <p:cNvSpPr>
+            <a:spLocks noGrp="1"/>
+          </p:cNvSpPr>
+          <p:nvPr>
+            <p:ph type="body"/>
+          </p:nvPr>
+        </p:nvSpPr>
+        <p:spPr>
+          <a:xfrm>
+            <a:off x="609480" y="1604520"/>
+            <a:ext cx="10972080" cy="3976920"/>
+          </a:xfrm>
+          <a:prstGeom prst="rect">
+            <a:avLst/>
+          </a:prstGeom>
+        </p:spPr>
+        <p:txBody>
+          <a:bodyPr lIns="0" rIns="0" tIns="0" bIns="0">
+            <a:normAutofit/>
+          </a:bodyPr>
+          <a:p>
+            <a:pPr marL="432000" indent="-324000">
+              <a:spcBef>
+                <a:spcPts val="1417"/>
+              </a:spcBef>
+              <a:buClr>
+                <a:srgbClr val="000000"/>
+              </a:buClr>
+              <a:buSzPct val="45000"/>
+              <a:buFont typeface="Wingdings" charset="2"/>
+              <a:buChar char=""/>
+            </a:pPr>
+            <a:r>
+              <a:rPr b="0" lang="pt-PT" sz="1800" spc="-1" strike="noStrike">
+                <a:latin typeface="Arial"/>
+              </a:rPr>
+              <a:t>Clique para editar o formato de texto dos tópicos</a:t>
+            </a:r>
+            <a:endParaRPr b="0" lang="pt-PT" sz="1800" spc="-1" strike="noStrike">
+              <a:latin typeface="Arial"/>
+            </a:endParaRPr>
+          </a:p>
+          <a:p>
+            <a:pPr lvl="1" marL="864000" indent="-324000">
+              <a:spcBef>
+                <a:spcPts val="1134"/>
+              </a:spcBef>
+              <a:buClr>
+                <a:srgbClr val="000000"/>
+              </a:buClr>
+              <a:buSzPct val="75000"/>
+              <a:buFont typeface="Symbol" charset="2"/>
+              <a:buChar char=""/>
+            </a:pPr>
+            <a:r>
+              <a:rPr b="0" lang="pt-PT" sz="1800" spc="-1" strike="noStrike">
+                <a:latin typeface="Arial"/>
+              </a:rPr>
+              <a:t>Segundo nível de tópicos</a:t>
+            </a:r>
+            <a:endParaRPr b="0" lang="pt-PT" sz="1800" spc="-1" strike="noStrike">
+              <a:latin typeface="Arial"/>
+            </a:endParaRPr>
+          </a:p>
+          <a:p>
+            <a:pPr lvl="2" marL="1296000" indent="-288000">
+              <a:spcBef>
+                <a:spcPts val="850"/>
+              </a:spcBef>
+              <a:buClr>
+                <a:srgbClr val="000000"/>
+              </a:buClr>
+              <a:buSzPct val="45000"/>
+              <a:buFont typeface="Wingdings" charset="2"/>
+              <a:buChar char=""/>
+            </a:pPr>
+            <a:r>
+              <a:rPr b="0" lang="pt-PT" sz="1800" spc="-1" strike="noStrike">
+                <a:latin typeface="Arial"/>
+              </a:rPr>
+              <a:t>Terceiro nível de tópicos</a:t>
+            </a:r>
+            <a:endParaRPr b="0" lang="pt-PT" sz="1800" spc="-1" strike="noStrike">
+              <a:latin typeface="Arial"/>
+            </a:endParaRPr>
+          </a:p>
+          <a:p>
+            <a:pPr lvl="3" marL="1728000" indent="-216000">
+              <a:spcBef>
+                <a:spcPts val="567"/>
+              </a:spcBef>
+              <a:buClr>
+                <a:srgbClr val="000000"/>
+              </a:buClr>
+              <a:buSzPct val="75000"/>
+              <a:buFont typeface="Symbol" charset="2"/>
+              <a:buChar char=""/>
+            </a:pPr>
+            <a:r>
+              <a:rPr b="0" lang="pt-PT" sz="1800" spc="-1" strike="noStrike">
+                <a:latin typeface="Arial"/>
+              </a:rPr>
+              <a:t>Quarto nível de tópicos</a:t>
+            </a:r>
+            <a:endParaRPr b="0" lang="pt-PT" sz="1800" spc="-1" strike="noStrike">
+              <a:latin typeface="Arial"/>
+            </a:endParaRPr>
+          </a:p>
+          <a:p>
+            <a:pPr lvl="4" marL="2160000" indent="-216000">
+              <a:spcBef>
+                <a:spcPts val="283"/>
+              </a:spcBef>
+              <a:buClr>
+                <a:srgbClr val="000000"/>
+              </a:buClr>
+              <a:buSzPct val="45000"/>
+              <a:buFont typeface="Wingdings" charset="2"/>
+              <a:buChar char=""/>
+            </a:pPr>
+            <a:r>
+              <a:rPr b="0" lang="pt-PT" sz="1800" spc="-1" strike="noStrike">
+                <a:latin typeface="Arial"/>
+              </a:rPr>
+              <a:t>Quinto nível de tópicos</a:t>
+            </a:r>
+            <a:endParaRPr b="0" lang="pt-PT" sz="1800" spc="-1" strike="noStrike">
+              <a:latin typeface="Arial"/>
+            </a:endParaRPr>
+          </a:p>
+          <a:p>
+            <a:pPr lvl="5" marL="2592000" indent="-216000">
+              <a:spcBef>
+                <a:spcPts val="283"/>
+              </a:spcBef>
+              <a:buClr>
+                <a:srgbClr val="000000"/>
+              </a:buClr>
+              <a:buSzPct val="45000"/>
+              <a:buFont typeface="Wingdings" charset="2"/>
+              <a:buChar char=""/>
+            </a:pPr>
+            <a:r>
+              <a:rPr b="0" lang="pt-PT" sz="1800" spc="-1" strike="noStrike">
+                <a:latin typeface="Arial"/>
+              </a:rPr>
+              <a:t>Sexto nível de tópicos</a:t>
+            </a:r>
+            <a:endParaRPr b="0" lang="pt-PT" sz="1800" spc="-1" strike="noStrike">
+              <a:latin typeface="Arial"/>
+            </a:endParaRPr>
+          </a:p>
+          <a:p>
+            <a:pPr lvl="6" marL="3024000" indent="-216000">
+              <a:spcBef>
+                <a:spcPts val="283"/>
+              </a:spcBef>
+              <a:buClr>
+                <a:srgbClr val="000000"/>
+              </a:buClr>
+              <a:buSzPct val="45000"/>
+              <a:buFont typeface="Wingdings" charset="2"/>
+              <a:buChar char=""/>
+            </a:pPr>
+            <a:r>
+              <a:rPr b="0" lang="pt-PT" sz="1800" spc="-1" strike="noStrike">
+                <a:latin typeface="Arial"/>
+              </a:rPr>
+              <a:t>Sétimo nível de tópicos</a:t>
+            </a:r>
+            <a:endParaRPr b="0" lang="pt-PT" sz="1800" spc="-1" strike="noStrike">
+              <a:latin typeface="Arial"/>
+            </a:endParaRPr>
+          </a:p>
+        </p:txBody>
+      </p:sp>
+    </p:spTree>
+  </p:cSld>
+  <p:clrMap bg1="lt1" bg2="lt2" tx1="dk1" tx2="dk2" accent1="accent1" accent2="accent2" accent3="accent3" accent4="accent4" accent5="accent5" accent6="accent6" hlink="hlink" folHlink="folHlink"/>
+  <p:sldLayoutIdLst>
+    <p:sldLayoutId id="2147483675" r:id="rId2"/>
+    <p:sldLayoutId id="2147483676" r:id="rId3"/>
+    <p:sldLayoutId id="2147483677" r:id="rId4"/>
+    <p:sldLayoutId id="2147483678" r:id="rId5"/>
+    <p:sldLayoutId id="2147483679" r:id="rId6"/>
+    <p:sldLayoutId id="2147483680" r:id="rId7"/>
+    <p:sldLayoutId id="2147483681" r:id="rId8"/>
+    <p:sldLayoutId id="2147483682" r:id="rId9"/>
+    <p:sldLayoutId id="2147483683" r:id="rId10"/>
+    <p:sldLayoutId id="2147483684" r:id="rId11"/>
+    <p:sldLayoutId id="2147483685" r:id="rId12"/>
+    <p:sldLayoutId id="2147483686" r:id="rId13"/>
+  </p:sldLayoutIdLst>
+</p:sldMaster>
+</file>
+
 <file path=ppt/slides/slide1.xml><?xml version="1.0" encoding="utf-8"?>
 <p:sld xmlns:a="http://schemas.openxmlformats.org/drawingml/2006/main" xmlns:p="http://schemas.openxmlformats.org/presentationml/2006/main" xmlns:r="http://schemas.openxmlformats.org/officeDocument/2006/relationships" xmlns:p14="http://schemas.microsoft.com/office/powerpoint/2010/main" xmlns:p15="http://schemas.microsoft.com/office/powerpoint/2012/main" xmlns:mc="http://schemas.openxmlformats.org/markup-compatibility/2006">
   <p:cSld>
@@ -3272,14 +4888,14 @@
       </p:grpSpPr>
       <p:sp>
         <p:nvSpPr>
-          <p:cNvPr id="76" name="Subtítulo 2"/>
+          <p:cNvPr id="114" name="Subtítulo 2"/>
           <p:cNvSpPr/>
           <p:nvPr/>
         </p:nvSpPr>
         <p:spPr>
           <a:xfrm>
             <a:off x="1523880" y="2601000"/>
-            <a:ext cx="9143280" cy="1654920"/>
+            <a:ext cx="9142920" cy="1654560"/>
           </a:xfrm>
           <a:prstGeom prst="rect">
             <a:avLst/>
@@ -3317,6 +4933,7 @@
                   <a:srgbClr val="000000"/>
                 </a:solidFill>
                 <a:latin typeface="Calibri"/>
+                <a:ea typeface="DejaVu Sans"/>
               </a:rPr>
               <a:t>Algoritmos e Estruturas de Dados</a:t>
             </a:r>
@@ -3328,7 +4945,7 @@
       </p:sp>
       <p:pic>
         <p:nvPicPr>
-          <p:cNvPr id="77" name="Imagem 8" descr=""/>
+          <p:cNvPr id="115" name="Imagem 8" descr=""/>
           <p:cNvPicPr/>
           <p:nvPr/>
         </p:nvPicPr>
@@ -3339,7 +4956,7 @@
         <p:spPr>
           <a:xfrm>
             <a:off x="2723400" y="0"/>
-            <a:ext cx="6744600" cy="2339640"/>
+            <a:ext cx="6744240" cy="2339280"/>
           </a:xfrm>
           <a:prstGeom prst="rect">
             <a:avLst/>
@@ -3351,7 +4968,7 @@
       </p:pic>
       <p:sp>
         <p:nvSpPr>
-          <p:cNvPr id="78" name="Conexão reta 12"/>
+          <p:cNvPr id="116" name="Conexão reta 12"/>
           <p:cNvSpPr/>
           <p:nvPr/>
         </p:nvSpPr>
@@ -3384,14 +5001,14 @@
       </p:sp>
       <p:sp>
         <p:nvSpPr>
-          <p:cNvPr id="79" name="CaixaDeTexto 13"/>
+          <p:cNvPr id="117" name="CaixaDeTexto 13"/>
           <p:cNvSpPr/>
           <p:nvPr/>
         </p:nvSpPr>
         <p:spPr>
           <a:xfrm>
             <a:off x="2259000" y="3753360"/>
-            <a:ext cx="7673400" cy="1735920"/>
+            <a:ext cx="7673040" cy="1735560"/>
           </a:xfrm>
           <a:prstGeom prst="rect">
             <a:avLst/>
@@ -3555,14 +5172,14 @@
       </p:grpSpPr>
       <p:sp>
         <p:nvSpPr>
-          <p:cNvPr id="98" name="Título 1"/>
+          <p:cNvPr id="136" name="Título 1"/>
           <p:cNvSpPr/>
           <p:nvPr/>
         </p:nvSpPr>
         <p:spPr>
           <a:xfrm>
             <a:off x="838080" y="365040"/>
-            <a:ext cx="10514880" cy="1324800"/>
+            <a:ext cx="10514520" cy="1324440"/>
           </a:xfrm>
           <a:prstGeom prst="rect">
             <a:avLst/>
@@ -3594,6 +5211,7 @@
                   <a:srgbClr val="000000"/>
                 </a:solidFill>
                 <a:latin typeface="Calibri Light"/>
+                <a:ea typeface="DejaVu Sans"/>
               </a:rPr>
               <a:t>Outras observações/Exemplos de Execução</a:t>
             </a:r>
@@ -3605,14 +5223,14 @@
       </p:sp>
       <p:sp>
         <p:nvSpPr>
-          <p:cNvPr id="99" name="Marcador de Posição de Conteúdo 2"/>
+          <p:cNvPr id="137" name="Marcador de Posição de Conteúdo 2"/>
           <p:cNvSpPr/>
           <p:nvPr/>
         </p:nvSpPr>
         <p:spPr>
           <a:xfrm>
             <a:off x="838080" y="1825560"/>
-            <a:ext cx="10514880" cy="4350600"/>
+            <a:ext cx="10514520" cy="4350240"/>
           </a:xfrm>
           <a:prstGeom prst="rect">
             <a:avLst/>
@@ -3650,6 +5268,7 @@
                   <a:srgbClr val="000000"/>
                 </a:solidFill>
                 <a:latin typeface="Calibri"/>
+                <a:ea typeface="DejaVu Sans"/>
               </a:rPr>
               <a:t>Não é necessário, pode ser apagado depois</a:t>
             </a:r>
@@ -3675,6 +5294,7 @@
                   <a:srgbClr val="000000"/>
                 </a:solidFill>
                 <a:latin typeface="Calibri"/>
+                <a:ea typeface="DejaVu Sans"/>
               </a:rPr>
               <a:t>max 5 diapositivos</a:t>
             </a:r>
@@ -3716,14 +5336,14 @@
       </p:grpSpPr>
       <p:sp>
         <p:nvSpPr>
-          <p:cNvPr id="80" name="Título 1"/>
+          <p:cNvPr id="118" name="Título 1"/>
           <p:cNvSpPr/>
           <p:nvPr/>
         </p:nvSpPr>
         <p:spPr>
           <a:xfrm>
             <a:off x="838080" y="365040"/>
-            <a:ext cx="10514880" cy="1324800"/>
+            <a:ext cx="10514520" cy="1324440"/>
           </a:xfrm>
           <a:prstGeom prst="rect">
             <a:avLst/>
@@ -3755,6 +5375,7 @@
                   <a:srgbClr val="000000"/>
                 </a:solidFill>
                 <a:latin typeface="Calibri Light"/>
+                <a:ea typeface="DejaVu Sans"/>
               </a:rPr>
               <a:t>Descrição do Problema</a:t>
             </a:r>
@@ -3766,14 +5387,14 @@
       </p:sp>
       <p:sp>
         <p:nvSpPr>
-          <p:cNvPr id="81" name="Marcador de Posição de Conteúdo 2"/>
+          <p:cNvPr id="119" name="Marcador de Posição de Conteúdo 2"/>
           <p:cNvSpPr/>
           <p:nvPr/>
         </p:nvSpPr>
         <p:spPr>
           <a:xfrm>
             <a:off x="838080" y="1825560"/>
-            <a:ext cx="10514880" cy="4350600"/>
+            <a:ext cx="10514520" cy="4350240"/>
           </a:xfrm>
           <a:prstGeom prst="rect">
             <a:avLst/>
@@ -3811,17 +5432,9 @@
                   <a:srgbClr val="000000"/>
                 </a:solidFill>
                 <a:latin typeface="Calibri"/>
+                <a:ea typeface="DejaVu Sans"/>
               </a:rPr>
-              <a:t>I</a:t>
-            </a:r>
-            <a:r>
-              <a:rPr b="0" lang="pt-PT" sz="2800" spc="-1" strike="noStrike">
-                <a:solidFill>
-                  <a:srgbClr val="000000"/>
-                </a:solidFill>
-                <a:latin typeface="Calibri"/>
-              </a:rPr>
-              <a:t>mplementar um sistema de gestão de informação para uma companhia aérea, capaz de guardar e gerir informação relativa a aviões, voos, passageiros, bagagens e aeroportos.</a:t>
+              <a:t>Implementar um sistema de gestão de informação para uma companhia aérea, capaz de guardar e gerir informação relativa a aviões, voos, passageiros, bagagens e aeroportos.</a:t>
             </a:r>
             <a:endParaRPr b="0" lang="pt-PT" sz="2800" spc="-1" strike="noStrike">
               <a:latin typeface="Arial"/>
@@ -3845,6 +5458,7 @@
                   <a:srgbClr val="000000"/>
                 </a:solidFill>
                 <a:latin typeface="Calibri"/>
+                <a:ea typeface="DejaVu Sans"/>
               </a:rPr>
               <a:t>…</a:t>
             </a:r>
@@ -3902,14 +5516,14 @@
       </p:grpSpPr>
       <p:sp>
         <p:nvSpPr>
-          <p:cNvPr id="82" name="Título 1"/>
+          <p:cNvPr id="120" name="Título 1"/>
           <p:cNvSpPr/>
           <p:nvPr/>
         </p:nvSpPr>
         <p:spPr>
           <a:xfrm>
             <a:off x="838080" y="365040"/>
-            <a:ext cx="10514880" cy="1324800"/>
+            <a:ext cx="10514520" cy="1324440"/>
           </a:xfrm>
           <a:prstGeom prst="rect">
             <a:avLst/>
@@ -3941,6 +5555,7 @@
                   <a:srgbClr val="000000"/>
                 </a:solidFill>
                 <a:latin typeface="Calibri Light"/>
+                <a:ea typeface="DejaVu Sans"/>
               </a:rPr>
               <a:t>Solução</a:t>
             </a:r>
@@ -3952,14 +5567,14 @@
       </p:sp>
       <p:sp>
         <p:nvSpPr>
-          <p:cNvPr id="83" name="Marcador de Posição de Conteúdo 2"/>
+          <p:cNvPr id="121" name="Marcador de Posição de Conteúdo 2"/>
           <p:cNvSpPr/>
           <p:nvPr/>
         </p:nvSpPr>
         <p:spPr>
           <a:xfrm>
             <a:off x="838080" y="1825560"/>
-            <a:ext cx="10514880" cy="4350600"/>
+            <a:ext cx="10514520" cy="4350240"/>
           </a:xfrm>
           <a:prstGeom prst="rect">
             <a:avLst/>
@@ -3997,6 +5612,7 @@
                   <a:srgbClr val="000000"/>
                 </a:solidFill>
                 <a:latin typeface="Calibri"/>
+                <a:ea typeface="DejaVu Sans"/>
               </a:rPr>
               <a:t>max 2 diapositivos</a:t>
             </a:r>
@@ -4008,14 +5624,14 @@
       </p:sp>
       <p:sp>
         <p:nvSpPr>
-          <p:cNvPr id="84" name=""/>
-          <p:cNvSpPr txBox="1"/>
+          <p:cNvPr id="122" name=""/>
+          <p:cNvSpPr/>
           <p:nvPr/>
         </p:nvSpPr>
         <p:spPr>
           <a:xfrm>
             <a:off x="720000" y="1620000"/>
-            <a:ext cx="10972440" cy="4790160"/>
+            <a:ext cx="10972080" cy="4789800"/>
           </a:xfrm>
           <a:prstGeom prst="rect">
             <a:avLst/>
@@ -4025,12 +5641,21 @@
             <a:noFill/>
           </a:ln>
         </p:spPr>
+        <p:style>
+          <a:lnRef idx="0"/>
+          <a:fillRef idx="0"/>
+          <a:effectRef idx="0"/>
+          <a:fontRef idx="minor"/>
+        </p:style>
         <p:txBody>
           <a:bodyPr lIns="0" rIns="0" tIns="0" bIns="0">
             <a:normAutofit fontScale="76000"/>
           </a:bodyPr>
           <a:p>
-            <a:pPr marL="432000" indent="-324000">
+            <a:pPr marL="432000" indent="-323640">
+              <a:lnSpc>
+                <a:spcPct val="100000"/>
+              </a:lnSpc>
               <a:spcBef>
                 <a:spcPts val="1417"/>
               </a:spcBef>
@@ -4048,11 +5673,14 @@
               <a:t>Implementámos um menu de forma a facilitar a interação com o programa;</a:t>
             </a:r>
             <a:endParaRPr b="0" lang="pt-PT" sz="2800" spc="-1" strike="noStrike">
-              <a:latin typeface="Calibri"/>
-            </a:endParaRPr>
-          </a:p>
-          <a:p>
-            <a:pPr marL="432000" indent="-324000">
+              <a:latin typeface="Arial"/>
+            </a:endParaRPr>
+          </a:p>
+          <a:p>
+            <a:pPr marL="432000" indent="-323640">
+              <a:lnSpc>
+                <a:spcPct val="100000"/>
+              </a:lnSpc>
               <a:spcBef>
                 <a:spcPts val="1417"/>
               </a:spcBef>
@@ -4070,11 +5698,14 @@
               <a:t>O núcleo central do programa é a classe Airline, que gere as interações entre aviões, aeroportos e voos;</a:t>
             </a:r>
             <a:endParaRPr b="0" lang="pt-PT" sz="2800" spc="-1" strike="noStrike">
-              <a:latin typeface="Calibri"/>
-            </a:endParaRPr>
-          </a:p>
-          <a:p>
-            <a:pPr marL="432000" indent="-324000">
+              <a:latin typeface="Arial"/>
+            </a:endParaRPr>
+          </a:p>
+          <a:p>
+            <a:pPr marL="432000" indent="-323640">
+              <a:lnSpc>
+                <a:spcPct val="100000"/>
+              </a:lnSpc>
               <a:spcBef>
                 <a:spcPts val="1417"/>
               </a:spcBef>
@@ -4092,11 +5723,14 @@
               <a:t>Dentro das soluções, aos  problemas apresentados, que implementámos, eis dois exemplos:</a:t>
             </a:r>
             <a:endParaRPr b="0" lang="pt-PT" sz="2800" spc="-1" strike="noStrike">
-              <a:latin typeface="Calibri"/>
-            </a:endParaRPr>
-          </a:p>
-          <a:p>
-            <a:pPr marL="432000" indent="-324000">
+              <a:latin typeface="Arial"/>
+            </a:endParaRPr>
+          </a:p>
+          <a:p>
+            <a:pPr marL="432000" indent="-323640">
+              <a:lnSpc>
+                <a:spcPct val="100000"/>
+              </a:lnSpc>
               <a:spcBef>
                 <a:spcPts val="1417"/>
               </a:spcBef>
@@ -4114,11 +5748,14 @@
               <a:t>No tratamento dos serviços criamos duas filas(serviçosAcabados, serviçosMarcados), quando um novo serviço era criado, era colocado nos serviçosMarcados e depois de ser cumprido, era colocado nos serviçosAcabados.</a:t>
             </a:r>
             <a:endParaRPr b="0" lang="pt-PT" sz="2800" spc="-1" strike="noStrike">
-              <a:latin typeface="Calibri"/>
-            </a:endParaRPr>
-          </a:p>
-          <a:p>
-            <a:pPr marL="432000" indent="-324000">
+              <a:latin typeface="Arial"/>
+            </a:endParaRPr>
+          </a:p>
+          <a:p>
+            <a:pPr marL="432000" indent="-323640">
+              <a:lnSpc>
+                <a:spcPct val="100000"/>
+              </a:lnSpc>
               <a:spcBef>
                 <a:spcPts val="1417"/>
               </a:spcBef>
@@ -4136,7 +5773,7 @@
               <a:t>No tratamento das malas  criamos um sistema de transporte, composto por carruagens, que à medida que iam ficando cheias, novas carruagens eram acrescentadas. Cada carruagem possui 4 stacks e cada stack tem a capacidade maxima de 5 malas.</a:t>
             </a:r>
             <a:endParaRPr b="0" lang="pt-PT" sz="2800" spc="-1" strike="noStrike">
-              <a:latin typeface="Calibri"/>
+              <a:latin typeface="Arial"/>
             </a:endParaRPr>
           </a:p>
         </p:txBody>
@@ -4173,14 +5810,14 @@
       </p:grpSpPr>
       <p:sp>
         <p:nvSpPr>
-          <p:cNvPr id="85" name="Título 1"/>
+          <p:cNvPr id="123" name="Título 1"/>
           <p:cNvSpPr/>
           <p:nvPr/>
         </p:nvSpPr>
         <p:spPr>
           <a:xfrm>
             <a:off x="838080" y="365040"/>
-            <a:ext cx="10514880" cy="1324800"/>
+            <a:ext cx="10514520" cy="1324440"/>
           </a:xfrm>
           <a:prstGeom prst="rect">
             <a:avLst/>
@@ -4212,6 +5849,7 @@
                   <a:srgbClr val="000000"/>
                 </a:solidFill>
                 <a:latin typeface="Calibri Light"/>
+                <a:ea typeface="DejaVu Sans"/>
               </a:rPr>
               <a:t>Diagrama de Classes</a:t>
             </a:r>
@@ -4223,14 +5861,14 @@
       </p:sp>
       <p:sp>
         <p:nvSpPr>
-          <p:cNvPr id="86" name="Marcador de Posição de Conteúdo 2"/>
+          <p:cNvPr id="124" name="Marcador de Posição de Conteúdo 2"/>
           <p:cNvSpPr/>
           <p:nvPr/>
         </p:nvSpPr>
         <p:spPr>
           <a:xfrm>
             <a:off x="838080" y="1825560"/>
-            <a:ext cx="10514880" cy="4350600"/>
+            <a:ext cx="10514520" cy="4350240"/>
           </a:xfrm>
           <a:prstGeom prst="rect">
             <a:avLst/>
@@ -4279,14 +5917,14 @@
       </p:grpSpPr>
       <p:sp>
         <p:nvSpPr>
-          <p:cNvPr id="87" name="Título 1"/>
+          <p:cNvPr id="125" name="Título 1"/>
           <p:cNvSpPr/>
           <p:nvPr/>
         </p:nvSpPr>
         <p:spPr>
           <a:xfrm>
             <a:off x="838080" y="365040"/>
-            <a:ext cx="10514880" cy="1324800"/>
+            <a:ext cx="10514520" cy="1324440"/>
           </a:xfrm>
           <a:prstGeom prst="rect">
             <a:avLst/>
@@ -4318,6 +5956,7 @@
                   <a:srgbClr val="000000"/>
                 </a:solidFill>
                 <a:latin typeface="Calibri Light"/>
+                <a:ea typeface="DejaVu Sans"/>
               </a:rPr>
               <a:t>Estrutura de Ficheiros</a:t>
             </a:r>
@@ -4329,14 +5968,14 @@
       </p:sp>
       <p:sp>
         <p:nvSpPr>
-          <p:cNvPr id="88" name="Marcador de Posição de Conteúdo 2"/>
+          <p:cNvPr id="126" name="Marcador de Posição de Conteúdo 2"/>
           <p:cNvSpPr/>
           <p:nvPr/>
         </p:nvSpPr>
         <p:spPr>
           <a:xfrm>
             <a:off x="838080" y="1825560"/>
-            <a:ext cx="10514880" cy="4350600"/>
+            <a:ext cx="10514520" cy="4350240"/>
           </a:xfrm>
           <a:prstGeom prst="rect">
             <a:avLst/>
@@ -4357,7 +5996,7 @@
             <a:noAutofit/>
           </a:bodyPr>
           <a:p>
-            <a:pPr marL="228600" indent="-227880">
+            <a:pPr marL="228600" indent="-227520">
               <a:lnSpc>
                 <a:spcPct val="90000"/>
               </a:lnSpc>
@@ -4376,6 +6015,7 @@
                   <a:srgbClr val="000000"/>
                 </a:solidFill>
                 <a:latin typeface="Calibri"/>
+                <a:ea typeface="DejaVu Sans"/>
               </a:rPr>
               <a:t>Incluímos no  nosso projeto uma estrutura de ficheiros dos seguintes elementos:</a:t>
             </a:r>
@@ -4384,7 +6024,7 @@
             </a:endParaRPr>
           </a:p>
           <a:p>
-            <a:pPr marL="228600" indent="-227880">
+            <a:pPr marL="228600" indent="-227520">
               <a:lnSpc>
                 <a:spcPct val="90000"/>
               </a:lnSpc>
@@ -4403,6 +6043,7 @@
                   <a:srgbClr val="000000"/>
                 </a:solidFill>
                 <a:latin typeface="Calibri"/>
+                <a:ea typeface="DejaVu Sans"/>
               </a:rPr>
               <a:t>Aviões(tipoAvião, matrícula, capacidade, capacidadeCargo);</a:t>
             </a:r>
@@ -4411,7 +6052,7 @@
             </a:endParaRPr>
           </a:p>
           <a:p>
-            <a:pPr marL="228600" indent="-227880">
+            <a:pPr marL="228600" indent="-227520">
               <a:lnSpc>
                 <a:spcPct val="90000"/>
               </a:lnSpc>
@@ -4430,6 +6071,7 @@
                   <a:srgbClr val="000000"/>
                 </a:solidFill>
                 <a:latin typeface="Calibri"/>
+                <a:ea typeface="DejaVu Sans"/>
               </a:rPr>
               <a:t>Aeroportos(nomeAeroporto, aviõesAterrados);</a:t>
             </a:r>
@@ -4438,7 +6080,7 @@
             </a:endParaRPr>
           </a:p>
           <a:p>
-            <a:pPr marL="228600" indent="-227880">
+            <a:pPr marL="228600" indent="-227520">
               <a:lnSpc>
                 <a:spcPct val="90000"/>
               </a:lnSpc>
@@ -4457,6 +6099,7 @@
                   <a:srgbClr val="000000"/>
                 </a:solidFill>
                 <a:latin typeface="Calibri"/>
+                <a:ea typeface="DejaVu Sans"/>
               </a:rPr>
               <a:t>Voos(número, data, duração, matrícula, origem, destino);</a:t>
             </a:r>
@@ -4465,7 +6108,7 @@
             </a:endParaRPr>
           </a:p>
           <a:p>
-            <a:pPr marL="228600" indent="-227880">
+            <a:pPr marL="228600" indent="-227520">
               <a:lnSpc>
                 <a:spcPct val="90000"/>
               </a:lnSpc>
@@ -4484,6 +6127,7 @@
                   <a:srgbClr val="000000"/>
                 </a:solidFill>
                 <a:latin typeface="Calibri"/>
+                <a:ea typeface="DejaVu Sans"/>
               </a:rPr>
               <a:t>Locais de transporte terrestre(Aeroporto, tipoTransporte, distância, horaAbertura, horaFecho);</a:t>
             </a:r>
@@ -4492,7 +6136,7 @@
             </a:endParaRPr>
           </a:p>
           <a:p>
-            <a:pPr marL="228600" indent="-227880">
+            <a:pPr marL="228600" indent="-227520">
               <a:lnSpc>
                 <a:spcPct val="90000"/>
               </a:lnSpc>
@@ -4511,6 +6155,7 @@
                   <a:srgbClr val="000000"/>
                 </a:solidFill>
                 <a:latin typeface="Calibri"/>
+                <a:ea typeface="DejaVu Sans"/>
               </a:rPr>
               <a:t>Serviços de limpezas(matrículaAvião, tipo, data, empregado).</a:t>
             </a:r>
@@ -4519,7 +6164,7 @@
             </a:endParaRPr>
           </a:p>
           <a:p>
-            <a:pPr marL="228600" indent="-227880">
+            <a:pPr marL="228600" indent="-227520">
               <a:lnSpc>
                 <a:spcPct val="90000"/>
               </a:lnSpc>
@@ -4538,6 +6183,7 @@
                   <a:srgbClr val="000000"/>
                 </a:solidFill>
                 <a:latin typeface="Calibri"/>
+                <a:ea typeface="DejaVu Sans"/>
               </a:rPr>
               <a:t>Nota:Os serviços de limpeza estão ordenados por ordem cronológica.</a:t>
             </a:r>
@@ -4579,14 +6225,14 @@
       </p:grpSpPr>
       <p:sp>
         <p:nvSpPr>
-          <p:cNvPr id="89" name="Título 1"/>
+          <p:cNvPr id="127" name="Título 1"/>
           <p:cNvSpPr/>
           <p:nvPr/>
         </p:nvSpPr>
         <p:spPr>
           <a:xfrm>
             <a:off x="838080" y="365040"/>
-            <a:ext cx="10514880" cy="1324800"/>
+            <a:ext cx="10514520" cy="1324440"/>
           </a:xfrm>
           <a:prstGeom prst="rect">
             <a:avLst/>
@@ -4618,6 +6264,7 @@
                   <a:srgbClr val="000000"/>
                 </a:solidFill>
                 <a:latin typeface="Calibri Light"/>
+                <a:ea typeface="DejaVu Sans"/>
               </a:rPr>
               <a:t>Funcionalidades Implementadas</a:t>
             </a:r>
@@ -4629,14 +6276,14 @@
       </p:sp>
       <p:sp>
         <p:nvSpPr>
-          <p:cNvPr id="90" name="Marcador de Posição de Conteúdo 2"/>
+          <p:cNvPr id="128" name="Marcador de Posição de Conteúdo 2"/>
           <p:cNvSpPr/>
           <p:nvPr/>
         </p:nvSpPr>
         <p:spPr>
           <a:xfrm>
             <a:off x="838080" y="1825560"/>
-            <a:ext cx="10514880" cy="4350600"/>
+            <a:ext cx="10514520" cy="4350240"/>
           </a:xfrm>
           <a:prstGeom prst="rect">
             <a:avLst/>
@@ -4674,6 +6321,7 @@
                   <a:srgbClr val="000000"/>
                 </a:solidFill>
                 <a:latin typeface="Calibri"/>
+                <a:ea typeface="DejaVu Sans"/>
               </a:rPr>
               <a:t>No que toca nas operações CRUD:</a:t>
             </a:r>
@@ -4682,7 +6330,7 @@
             </a:endParaRPr>
           </a:p>
           <a:p>
-            <a:pPr marL="216000" indent="-216000">
+            <a:pPr marL="216000" indent="-215640">
               <a:lnSpc>
                 <a:spcPct val="90000"/>
               </a:lnSpc>
@@ -4692,7 +6340,7 @@
               <a:buClr>
                 <a:srgbClr val="000000"/>
               </a:buClr>
-              <a:buFont typeface="Symbol" charset="2"/>
+              <a:buFont typeface="Symbol"/>
               <a:buChar char=""/>
               <a:tabLst>
                 <a:tab algn="l" pos="0"/>
@@ -4704,15 +6352,16 @@
                   <a:srgbClr val="000000"/>
                 </a:solidFill>
                 <a:latin typeface="Calibri"/>
+                <a:ea typeface="DejaVu Sans"/>
               </a:rPr>
-              <a:t>Na classe fligth, implementámos todas as operações CRUD e a mesma possui listagem total;</a:t>
+              <a:t>Na classe fligth, implementámos todas as operações CRUD e a mesma possui listagem parcial;</a:t>
             </a:r>
             <a:endParaRPr b="0" lang="pt-PT" sz="2800" spc="-1" strike="noStrike">
               <a:latin typeface="Arial"/>
             </a:endParaRPr>
           </a:p>
           <a:p>
-            <a:pPr marL="216000" indent="-216000">
+            <a:pPr marL="216000" indent="-215640">
               <a:lnSpc>
                 <a:spcPct val="90000"/>
               </a:lnSpc>
@@ -4722,7 +6371,7 @@
               <a:buClr>
                 <a:srgbClr val="000000"/>
               </a:buClr>
-              <a:buFont typeface="Symbol" charset="2"/>
+              <a:buFont typeface="Symbol"/>
               <a:buChar char=""/>
               <a:tabLst>
                 <a:tab algn="l" pos="0"/>
@@ -4734,6 +6383,7 @@
                   <a:srgbClr val="000000"/>
                 </a:solidFill>
                 <a:latin typeface="Calibri"/>
+                <a:ea typeface="DejaVu Sans"/>
               </a:rPr>
               <a:t>Na classe landTransportPlace,  implementámos as operações create e read, a mesma tem listagem parcial;</a:t>
             </a:r>
@@ -4742,7 +6392,7 @@
             </a:endParaRPr>
           </a:p>
           <a:p>
-            <a:pPr marL="216000" indent="-216000">
+            <a:pPr marL="216000" indent="-215640">
               <a:lnSpc>
                 <a:spcPct val="90000"/>
               </a:lnSpc>
@@ -4752,7 +6402,7 @@
               <a:buClr>
                 <a:srgbClr val="000000"/>
               </a:buClr>
-              <a:buFont typeface="Symbol" charset="2"/>
+              <a:buFont typeface="Symbol"/>
               <a:buChar char=""/>
               <a:tabLst>
                 <a:tab algn="l" pos="0"/>
@@ -4774,6 +6424,7 @@
                   <a:srgbClr val="000000"/>
                 </a:solidFill>
                 <a:latin typeface="Calibri"/>
+                <a:ea typeface="DejaVu Sans"/>
               </a:rPr>
               <a:t>implementámos as operações create e read, a mesma tem listagem parcial;</a:t>
             </a:r>
@@ -4782,7 +6433,7 @@
             </a:endParaRPr>
           </a:p>
           <a:p>
-            <a:pPr marL="216000" indent="-216000">
+            <a:pPr marL="216000" indent="-215640">
               <a:lnSpc>
                 <a:spcPct val="90000"/>
               </a:lnSpc>
@@ -4792,7 +6443,7 @@
               <a:buClr>
                 <a:srgbClr val="000000"/>
               </a:buClr>
-              <a:buFont typeface="Symbol" charset="2"/>
+              <a:buFont typeface="Symbol"/>
               <a:buChar char=""/>
               <a:tabLst>
                 <a:tab algn="l" pos="0"/>
@@ -4804,6 +6455,7 @@
                   <a:srgbClr val="000000"/>
                 </a:solidFill>
                 <a:latin typeface="Calibri"/>
+                <a:ea typeface="DejaVu Sans"/>
               </a:rPr>
               <a:t>Na classe plain, implementámos as operações CRUD, a mesma tem listagem total;</a:t>
             </a:r>
@@ -4812,7 +6464,7 @@
             </a:endParaRPr>
           </a:p>
           <a:p>
-            <a:pPr marL="216000" indent="-216000">
+            <a:pPr marL="216000" indent="-215640">
               <a:lnSpc>
                 <a:spcPct val="90000"/>
               </a:lnSpc>
@@ -4822,7 +6474,7 @@
               <a:buClr>
                 <a:srgbClr val="000000"/>
               </a:buClr>
-              <a:buFont typeface="Symbol" charset="2"/>
+              <a:buFont typeface="Symbol"/>
               <a:buChar char=""/>
               <a:tabLst>
                 <a:tab algn="l" pos="0"/>
@@ -4834,6 +6486,7 @@
                   <a:srgbClr val="000000"/>
                 </a:solidFill>
                 <a:latin typeface="Calibri"/>
+                <a:ea typeface="DejaVu Sans"/>
               </a:rPr>
               <a:t>Na classe airport, implementámos as operações create, read e update, a mesma tem listagem total;  </a:t>
             </a:r>
@@ -4875,14 +6528,14 @@
       </p:grpSpPr>
       <p:sp>
         <p:nvSpPr>
-          <p:cNvPr id="91" name=""/>
-          <p:cNvSpPr txBox="1"/>
+          <p:cNvPr id="129" name=""/>
+          <p:cNvSpPr/>
           <p:nvPr/>
         </p:nvSpPr>
         <p:spPr>
           <a:xfrm>
             <a:off x="609480" y="273600"/>
-            <a:ext cx="10972440" cy="1144800"/>
+            <a:ext cx="10972080" cy="1144440"/>
           </a:xfrm>
           <a:prstGeom prst="rect">
             <a:avLst/>
@@ -4892,6 +6545,12 @@
             <a:noFill/>
           </a:ln>
         </p:spPr>
+        <p:style>
+          <a:lnRef idx="0"/>
+          <a:fillRef idx="0"/>
+          <a:effectRef idx="0"/>
+          <a:fontRef idx="minor"/>
+        </p:style>
         <p:txBody>
           <a:bodyPr lIns="0" rIns="0" tIns="0" bIns="0" anchor="ctr">
             <a:noAutofit/>
@@ -4919,14 +6578,14 @@
       </p:sp>
       <p:sp>
         <p:nvSpPr>
-          <p:cNvPr id="92" name=""/>
-          <p:cNvSpPr txBox="1"/>
+          <p:cNvPr id="130" name=""/>
+          <p:cNvSpPr/>
           <p:nvPr/>
         </p:nvSpPr>
         <p:spPr>
           <a:xfrm>
             <a:off x="609480" y="1604520"/>
-            <a:ext cx="10972440" cy="3977280"/>
+            <a:ext cx="10972080" cy="3976920"/>
           </a:xfrm>
           <a:prstGeom prst="rect">
             <a:avLst/>
@@ -4936,12 +6595,21 @@
             <a:noFill/>
           </a:ln>
         </p:spPr>
+        <p:style>
+          <a:lnRef idx="0"/>
+          <a:fillRef idx="0"/>
+          <a:effectRef idx="0"/>
+          <a:fontRef idx="minor"/>
+        </p:style>
         <p:txBody>
           <a:bodyPr lIns="0" rIns="0" tIns="0" bIns="0">
             <a:normAutofit fontScale="76000"/>
           </a:bodyPr>
           <a:p>
-            <a:pPr marL="432000" indent="-324000">
+            <a:pPr marL="432000" indent="-323640">
+              <a:lnSpc>
+                <a:spcPct val="100000"/>
+              </a:lnSpc>
               <a:spcBef>
                 <a:spcPts val="1417"/>
               </a:spcBef>
@@ -4963,7 +6631,10 @@
             </a:endParaRPr>
           </a:p>
           <a:p>
-            <a:pPr marL="432000" indent="-324000">
+            <a:pPr marL="432000" indent="-323640">
+              <a:lnSpc>
+                <a:spcPct val="100000"/>
+              </a:lnSpc>
               <a:spcBef>
                 <a:spcPts val="1417"/>
               </a:spcBef>
@@ -4985,7 +6656,10 @@
             </a:endParaRPr>
           </a:p>
           <a:p>
-            <a:pPr marL="432000" indent="-324000">
+            <a:pPr marL="432000" indent="-323640">
+              <a:lnSpc>
+                <a:spcPct val="100000"/>
+              </a:lnSpc>
               <a:spcBef>
                 <a:spcPts val="1417"/>
               </a:spcBef>
@@ -5007,7 +6681,10 @@
             </a:endParaRPr>
           </a:p>
           <a:p>
-            <a:pPr marL="432000" indent="-324000">
+            <a:pPr marL="432000" indent="-323640">
+              <a:lnSpc>
+                <a:spcPct val="100000"/>
+              </a:lnSpc>
               <a:spcBef>
                 <a:spcPts val="1417"/>
               </a:spcBef>
@@ -5029,7 +6706,10 @@
             </a:endParaRPr>
           </a:p>
           <a:p>
-            <a:pPr marL="432000" indent="-324000">
+            <a:pPr marL="432000" indent="-323640">
+              <a:lnSpc>
+                <a:spcPct val="100000"/>
+              </a:lnSpc>
               <a:spcBef>
                 <a:spcPts val="1417"/>
               </a:spcBef>
@@ -5051,7 +6731,10 @@
             </a:endParaRPr>
           </a:p>
           <a:p>
-            <a:pPr marL="432000" indent="-324000">
+            <a:pPr marL="432000" indent="-323640">
+              <a:lnSpc>
+                <a:spcPct val="100000"/>
+              </a:lnSpc>
               <a:spcBef>
                 <a:spcPts val="1417"/>
               </a:spcBef>
@@ -5073,7 +6756,10 @@
             </a:endParaRPr>
           </a:p>
           <a:p>
-            <a:pPr marL="432000" indent="-324000">
+            <a:pPr marL="432000" indent="-323640">
+              <a:lnSpc>
+                <a:spcPct val="100000"/>
+              </a:lnSpc>
               <a:spcBef>
                 <a:spcPts val="1417"/>
               </a:spcBef>
@@ -5128,14 +6814,14 @@
       </p:grpSpPr>
       <p:sp>
         <p:nvSpPr>
-          <p:cNvPr id="93" name="Título 1"/>
+          <p:cNvPr id="131" name="Título 1"/>
           <p:cNvSpPr/>
           <p:nvPr/>
         </p:nvSpPr>
         <p:spPr>
           <a:xfrm>
             <a:off x="838080" y="365040"/>
-            <a:ext cx="10514880" cy="1324800"/>
+            <a:ext cx="10514520" cy="1324440"/>
           </a:xfrm>
           <a:prstGeom prst="rect">
             <a:avLst/>
@@ -5167,6 +6853,7 @@
                   <a:srgbClr val="000000"/>
                 </a:solidFill>
                 <a:latin typeface="Calibri Light"/>
+                <a:ea typeface="DejaVu Sans"/>
               </a:rPr>
               <a:t>Destaque de Funcionalidade</a:t>
             </a:r>
@@ -5178,14 +6865,14 @@
       </p:sp>
       <p:sp>
         <p:nvSpPr>
-          <p:cNvPr id="94" name="Marcador de Posição de Conteúdo 2"/>
+          <p:cNvPr id="132" name="Marcador de Posição de Conteúdo 2"/>
           <p:cNvSpPr/>
           <p:nvPr/>
         </p:nvSpPr>
         <p:spPr>
           <a:xfrm>
             <a:off x="838080" y="1825560"/>
-            <a:ext cx="10514880" cy="4350600"/>
+            <a:ext cx="10514520" cy="4350240"/>
           </a:xfrm>
           <a:prstGeom prst="rect">
             <a:avLst/>
@@ -5204,14 +6891,14 @@
       </p:sp>
       <p:sp>
         <p:nvSpPr>
-          <p:cNvPr id="95" name=""/>
-          <p:cNvSpPr txBox="1"/>
+          <p:cNvPr id="133" name=""/>
+          <p:cNvSpPr/>
           <p:nvPr/>
         </p:nvSpPr>
         <p:spPr>
           <a:xfrm>
             <a:off x="609480" y="1604520"/>
-            <a:ext cx="10972440" cy="3977280"/>
+            <a:ext cx="10972080" cy="3976920"/>
           </a:xfrm>
           <a:prstGeom prst="rect">
             <a:avLst/>
@@ -5221,12 +6908,21 @@
             <a:noFill/>
           </a:ln>
         </p:spPr>
+        <p:style>
+          <a:lnRef idx="0"/>
+          <a:fillRef idx="0"/>
+          <a:effectRef idx="0"/>
+          <a:fontRef idx="minor"/>
+        </p:style>
         <p:txBody>
           <a:bodyPr lIns="0" rIns="0" tIns="0" bIns="0">
             <a:normAutofit/>
           </a:bodyPr>
           <a:p>
-            <a:pPr marL="432000" indent="-324000">
+            <a:pPr marL="432000" indent="-323640">
+              <a:lnSpc>
+                <a:spcPct val="100000"/>
+              </a:lnSpc>
               <a:spcBef>
                 <a:spcPts val="1417"/>
               </a:spcBef>
@@ -5281,14 +6977,14 @@
       </p:grpSpPr>
       <p:sp>
         <p:nvSpPr>
-          <p:cNvPr id="96" name="Título 1"/>
+          <p:cNvPr id="134" name="Título 1"/>
           <p:cNvSpPr/>
           <p:nvPr/>
         </p:nvSpPr>
         <p:spPr>
           <a:xfrm>
             <a:off x="838080" y="365040"/>
-            <a:ext cx="10514880" cy="1324800"/>
+            <a:ext cx="10514520" cy="1324440"/>
           </a:xfrm>
           <a:prstGeom prst="rect">
             <a:avLst/>
@@ -5320,6 +7016,7 @@
                   <a:srgbClr val="000000"/>
                 </a:solidFill>
                 <a:latin typeface="Calibri Light"/>
+                <a:ea typeface="DejaVu Sans"/>
               </a:rPr>
               <a:t>Principais dificuldades</a:t>
             </a:r>
@@ -5331,14 +7028,14 @@
       </p:sp>
       <p:sp>
         <p:nvSpPr>
-          <p:cNvPr id="97" name="Marcador de Posição de Conteúdo 2"/>
+          <p:cNvPr id="135" name="Marcador de Posição de Conteúdo 2"/>
           <p:cNvSpPr/>
           <p:nvPr/>
         </p:nvSpPr>
         <p:spPr>
           <a:xfrm>
             <a:off x="838080" y="1825560"/>
-            <a:ext cx="10514880" cy="4350600"/>
+            <a:ext cx="10514520" cy="4350240"/>
           </a:xfrm>
           <a:prstGeom prst="rect">
             <a:avLst/>
@@ -5818,4 +7515,230 @@
     </a:fmtScheme>
   </a:themeElements>
 </a:theme>
+</file>
+
+<file path=ppt/theme/theme3.xml><?xml version="1.0" encoding="utf-8"?>
+<a:theme xmlns:a="http://schemas.openxmlformats.org/drawingml/2006/main" name="Office Theme">
+  <a:themeElements>
+    <a:clrScheme name="Office">
+      <a:dk1>
+        <a:sysClr val="windowText" lastClr="000000"/>
+      </a:dk1>
+      <a:lt1>
+        <a:sysClr val="window" lastClr="FFFFFF"/>
+      </a:lt1>
+      <a:dk2>
+        <a:srgbClr val="44546a"/>
+      </a:dk2>
+      <a:lt2>
+        <a:srgbClr val="e7e6e6"/>
+      </a:lt2>
+      <a:accent1>
+        <a:srgbClr val="4472c4"/>
+      </a:accent1>
+      <a:accent2>
+        <a:srgbClr val="ed7d31"/>
+      </a:accent2>
+      <a:accent3>
+        <a:srgbClr val="a5a5a5"/>
+      </a:accent3>
+      <a:accent4>
+        <a:srgbClr val="ffc000"/>
+      </a:accent4>
+      <a:accent5>
+        <a:srgbClr val="5b9bd5"/>
+      </a:accent5>
+      <a:accent6>
+        <a:srgbClr val="70ad47"/>
+      </a:accent6>
+      <a:hlink>
+        <a:srgbClr val="0563c1"/>
+      </a:hlink>
+      <a:folHlink>
+        <a:srgbClr val="954f72"/>
+      </a:folHlink>
+    </a:clrScheme>
+    <a:fontScheme name="Office">
+      <a:majorFont>
+        <a:latin typeface="Arial"/>
+        <a:ea typeface="DejaVu Sans"/>
+        <a:cs typeface="DejaVu Sans"/>
+      </a:majorFont>
+      <a:minorFont>
+        <a:latin typeface="Arial"/>
+        <a:ea typeface="DejaVu Sans"/>
+        <a:cs typeface="DejaVu Sans"/>
+      </a:minorFont>
+    </a:fontScheme>
+    <a:fmtScheme name="Office">
+      <a:fillStyleLst>
+        <a:solidFill>
+          <a:schemeClr val="phClr"/>
+        </a:solidFill>
+        <a:gradFill rotWithShape="1">
+          <a:gsLst>
+            <a:gs pos="0">
+              <a:schemeClr val="phClr">
+                <a:tint val="50000"/>
+                <a:satMod val="300000"/>
+              </a:schemeClr>
+            </a:gs>
+            <a:gs pos="35000">
+              <a:schemeClr val="phClr">
+                <a:tint val="37000"/>
+                <a:satMod val="300000"/>
+              </a:schemeClr>
+            </a:gs>
+            <a:gs pos="100000">
+              <a:schemeClr val="phClr">
+                <a:tint val="15000"/>
+                <a:satMod val="350000"/>
+              </a:schemeClr>
+            </a:gs>
+          </a:gsLst>
+          <a:lin ang="16200000" scaled="1"/>
+        </a:gradFill>
+        <a:gradFill rotWithShape="1">
+          <a:gsLst>
+            <a:gs pos="0">
+              <a:schemeClr val="phClr">
+                <a:shade val="51000"/>
+                <a:satMod val="130000"/>
+              </a:schemeClr>
+            </a:gs>
+            <a:gs pos="80000">
+              <a:schemeClr val="phClr">
+                <a:shade val="93000"/>
+                <a:satMod val="130000"/>
+              </a:schemeClr>
+            </a:gs>
+            <a:gs pos="100000">
+              <a:schemeClr val="phClr">
+                <a:shade val="94000"/>
+                <a:satMod val="135000"/>
+              </a:schemeClr>
+            </a:gs>
+          </a:gsLst>
+          <a:lin ang="16200000" scaled="0"/>
+        </a:gradFill>
+      </a:fillStyleLst>
+      <a:lnStyleLst>
+        <a:ln w="9525" cap="flat" cmpd="sng" algn="ctr">
+          <a:solidFill>
+            <a:schemeClr val="phClr">
+              <a:shade val="95000"/>
+              <a:satMod val="105000"/>
+            </a:schemeClr>
+          </a:solidFill>
+          <a:prstDash val="solid"/>
+          <a:miter/>
+        </a:ln>
+        <a:ln w="25400" cap="flat" cmpd="sng" algn="ctr">
+          <a:solidFill>
+            <a:schemeClr val="phClr"/>
+          </a:solidFill>
+          <a:prstDash val="solid"/>
+          <a:miter/>
+        </a:ln>
+        <a:ln w="38100" cap="flat" cmpd="sng" algn="ctr">
+          <a:solidFill>
+            <a:schemeClr val="phClr"/>
+          </a:solidFill>
+          <a:prstDash val="solid"/>
+          <a:miter/>
+        </a:ln>
+      </a:lnStyleLst>
+      <a:effectStyleLst>
+        <a:effectStyle>
+          <a:effectLst>
+            <a:outerShdw blurRad="40000" dist="20000" dir="5400000" rotWithShape="0">
+              <a:srgbClr val="000000">
+                <a:alpha val="38000"/>
+              </a:srgbClr>
+            </a:outerShdw>
+          </a:effectLst>
+        </a:effectStyle>
+        <a:effectStyle>
+          <a:effectLst>
+            <a:outerShdw blurRad="40000" dist="23000" dir="5400000" rotWithShape="0">
+              <a:srgbClr val="000000">
+                <a:alpha val="35000"/>
+              </a:srgbClr>
+            </a:outerShdw>
+          </a:effectLst>
+        </a:effectStyle>
+        <a:effectStyle>
+          <a:effectLst>
+            <a:outerShdw blurRad="40000" dist="23000" dir="5400000" rotWithShape="0">
+              <a:srgbClr val="000000">
+                <a:alpha val="35000"/>
+              </a:srgbClr>
+            </a:outerShdw>
+          </a:effectLst>
+          <a:scene3d>
+            <a:camera prst="orthographicFront">
+              <a:rot lat="0" lon="0" rev="0"/>
+            </a:camera>
+            <a:lightRig rig="threePt" dir="t">
+              <a:rot lat="0" lon="0" rev="1200000"/>
+            </a:lightRig>
+          </a:scene3d>
+          <a:sp3d>
+            <a:bevelT w="63500" h="25400"/>
+          </a:sp3d>
+        </a:effectStyle>
+      </a:effectStyleLst>
+      <a:bgFillStyleLst>
+        <a:solidFill>
+          <a:schemeClr val="phClr"/>
+        </a:solidFill>
+        <a:gradFill rotWithShape="1">
+          <a:gsLst>
+            <a:gs pos="0">
+              <a:schemeClr val="phClr">
+                <a:tint val="40000"/>
+                <a:satMod val="350000"/>
+              </a:schemeClr>
+            </a:gs>
+            <a:gs pos="40000">
+              <a:schemeClr val="phClr">
+                <a:tint val="45000"/>
+                <a:shade val="99000"/>
+                <a:satMod val="350000"/>
+              </a:schemeClr>
+            </a:gs>
+            <a:gs pos="100000">
+              <a:schemeClr val="phClr">
+                <a:shade val="20000"/>
+                <a:satMod val="255000"/>
+              </a:schemeClr>
+            </a:gs>
+          </a:gsLst>
+          <a:path path="circle">
+            <a:fillToRect l="50000" t="-80000" r="50000" b="180000"/>
+          </a:path>
+        </a:gradFill>
+        <a:gradFill rotWithShape="1">
+          <a:gsLst>
+            <a:gs pos="0">
+              <a:schemeClr val="phClr">
+                <a:tint val="80000"/>
+                <a:satMod val="300000"/>
+              </a:schemeClr>
+            </a:gs>
+            <a:gs pos="100000">
+              <a:schemeClr val="phClr">
+                <a:shade val="30000"/>
+                <a:satMod val="200000"/>
+              </a:schemeClr>
+            </a:gs>
+          </a:gsLst>
+          <a:path path="circle">
+            <a:fillToRect l="50000" t="50000" r="50000" b="50000"/>
+          </a:path>
+        </a:gradFill>
+      </a:bgFillStyleLst>
+    </a:fmtScheme>
+  </a:themeElements>
+</a:theme>
 </file>
</xml_diff>